<commit_message>
update project folder name to 002
</commit_message>
<xml_diff>
--- a/Manim/Learn Manim Library by Practice.pptx
+++ b/Manim/Learn Manim Library by Practice.pptx
@@ -5,14 +5,16 @@
     <p:sldMasterId id="2147483648" r:id="rId1"/>
   </p:sldMasterIdLst>
   <p:notesMasterIdLst>
-    <p:notesMasterId r:id="rId4"/>
+    <p:notesMasterId r:id="rId6"/>
   </p:notesMasterIdLst>
   <p:handoutMasterIdLst>
-    <p:handoutMasterId r:id="rId5"/>
+    <p:handoutMasterId r:id="rId7"/>
   </p:handoutMasterIdLst>
   <p:sldIdLst>
     <p:sldId id="256" r:id="rId2"/>
     <p:sldId id="267" r:id="rId3"/>
+    <p:sldId id="268" r:id="rId4"/>
+    <p:sldId id="269" r:id="rId5"/>
   </p:sldIdLst>
   <p:sldSz cx="12188825" cy="6858000"/>
   <p:notesSz cx="6858000" cy="9144000"/>
@@ -8216,6 +8218,950 @@
       </p:transition>
     </mc:Choice>
     <mc:Fallback xmlns="">
+      <p:transition spd="med">
+        <p:fade/>
+      </p:transition>
+    </mc:Fallback>
+  </mc:AlternateContent>
+</p:sld>
+</file>
+
+<file path=ppt/slides/slide3.xml><?xml version="1.0" encoding="utf-8"?>
+<p:sld xmlns:a="http://schemas.openxmlformats.org/drawingml/2006/main" xmlns:r="http://schemas.openxmlformats.org/officeDocument/2006/relationships" xmlns:p="http://schemas.openxmlformats.org/presentationml/2006/main">
+  <p:cSld>
+    <p:spTree>
+      <p:nvGrpSpPr>
+        <p:cNvPr id="1" name="">
+          <a:extLst>
+            <a:ext uri="{FF2B5EF4-FFF2-40B4-BE49-F238E27FC236}">
+              <a16:creationId xmlns:a16="http://schemas.microsoft.com/office/drawing/2014/main" id="{65DEFB53-3495-7EBD-5E21-3DAC6AF76D94}"/>
+            </a:ext>
+          </a:extLst>
+        </p:cNvPr>
+        <p:cNvGrpSpPr/>
+        <p:nvPr/>
+      </p:nvGrpSpPr>
+      <p:grpSpPr>
+        <a:xfrm>
+          <a:off x="0" y="0"/>
+          <a:ext cx="0" cy="0"/>
+          <a:chOff x="0" y="0"/>
+          <a:chExt cx="0" cy="0"/>
+        </a:xfrm>
+      </p:grpSpPr>
+      <p:sp>
+        <p:nvSpPr>
+          <p:cNvPr id="13" name="Title 12">
+            <a:extLst>
+              <a:ext uri="{FF2B5EF4-FFF2-40B4-BE49-F238E27FC236}">
+                <a16:creationId xmlns:a16="http://schemas.microsoft.com/office/drawing/2014/main" id="{E77215AF-CF7F-5E62-BFF1-BCB4196BF304}"/>
+              </a:ext>
+            </a:extLst>
+          </p:cNvPr>
+          <p:cNvSpPr>
+            <a:spLocks noGrp="1"/>
+          </p:cNvSpPr>
+          <p:nvPr>
+            <p:ph type="title"/>
+          </p:nvPr>
+        </p:nvSpPr>
+        <p:spPr>
+          <a:xfrm>
+            <a:off x="1593436" y="260649"/>
+            <a:ext cx="6174521" cy="864096"/>
+          </a:xfrm>
+        </p:spPr>
+        <p:txBody>
+          <a:bodyPr anchor="ctr">
+            <a:normAutofit fontScale="90000"/>
+          </a:bodyPr>
+          <a:lstStyle/>
+          <a:p>
+            <a:r>
+              <a:rPr lang="en-US" sz="6000" b="1" dirty="0">
+                <a:latin typeface="ADLaM Display" panose="02010000000000000000" pitchFamily="2" charset="0"/>
+                <a:ea typeface="ADLaM Display" panose="02010000000000000000" pitchFamily="2" charset="0"/>
+                <a:cs typeface="ADLaM Display" panose="02010000000000000000" pitchFamily="2" charset="0"/>
+              </a:rPr>
+              <a:t>Learning Manim</a:t>
+            </a:r>
+          </a:p>
+        </p:txBody>
+      </p:sp>
+      <p:pic>
+        <p:nvPicPr>
+          <p:cNvPr id="4" name="Picture 3">
+            <a:extLst>
+              <a:ext uri="{FF2B5EF4-FFF2-40B4-BE49-F238E27FC236}">
+                <a16:creationId xmlns:a16="http://schemas.microsoft.com/office/drawing/2014/main" id="{55CC6021-B110-C65C-F993-CBD8BDD9C3B8}"/>
+              </a:ext>
+            </a:extLst>
+          </p:cNvPr>
+          <p:cNvPicPr>
+            <a:picLocks noChangeAspect="1"/>
+          </p:cNvPicPr>
+          <p:nvPr/>
+        </p:nvPicPr>
+        <p:blipFill>
+          <a:blip r:embed="rId2"/>
+          <a:stretch>
+            <a:fillRect/>
+          </a:stretch>
+        </p:blipFill>
+        <p:spPr>
+          <a:xfrm>
+            <a:off x="7767957" y="83058"/>
+            <a:ext cx="4420868" cy="1512168"/>
+          </a:xfrm>
+          <a:prstGeom prst="rect">
+            <a:avLst/>
+          </a:prstGeom>
+        </p:spPr>
+      </p:pic>
+      <p:pic>
+        <p:nvPicPr>
+          <p:cNvPr id="5" name="Picture 4">
+            <a:extLst>
+              <a:ext uri="{FF2B5EF4-FFF2-40B4-BE49-F238E27FC236}">
+                <a16:creationId xmlns:a16="http://schemas.microsoft.com/office/drawing/2014/main" id="{60070E94-D69A-7D90-0E1B-841A52053471}"/>
+              </a:ext>
+            </a:extLst>
+          </p:cNvPr>
+          <p:cNvPicPr>
+            <a:picLocks noChangeAspect="1"/>
+          </p:cNvPicPr>
+          <p:nvPr/>
+        </p:nvPicPr>
+        <p:blipFill>
+          <a:blip r:embed="rId3"/>
+          <a:stretch>
+            <a:fillRect/>
+          </a:stretch>
+        </p:blipFill>
+        <p:spPr>
+          <a:xfrm>
+            <a:off x="117748" y="5589240"/>
+            <a:ext cx="1152128" cy="1180931"/>
+          </a:xfrm>
+          <a:prstGeom prst="rect">
+            <a:avLst/>
+          </a:prstGeom>
+          <a:ln>
+            <a:noFill/>
+          </a:ln>
+          <a:effectLst>
+            <a:softEdge rad="112500"/>
+          </a:effectLst>
+        </p:spPr>
+      </p:pic>
+      <p:sp>
+        <p:nvSpPr>
+          <p:cNvPr id="6" name="Subtitle 2">
+            <a:extLst>
+              <a:ext uri="{FF2B5EF4-FFF2-40B4-BE49-F238E27FC236}">
+                <a16:creationId xmlns:a16="http://schemas.microsoft.com/office/drawing/2014/main" id="{2DFCCB65-82A2-0FBF-4361-DA6246AC3A7C}"/>
+              </a:ext>
+            </a:extLst>
+          </p:cNvPr>
+          <p:cNvSpPr txBox="1">
+            <a:spLocks/>
+          </p:cNvSpPr>
+          <p:nvPr/>
+        </p:nvSpPr>
+        <p:spPr>
+          <a:xfrm>
+            <a:off x="-1022" y="1484784"/>
+            <a:ext cx="1701923" cy="1368152"/>
+          </a:xfrm>
+          <a:prstGeom prst="rect">
+            <a:avLst/>
+          </a:prstGeom>
+        </p:spPr>
+        <p:style>
+          <a:lnRef idx="0">
+            <a:schemeClr val="accent2"/>
+          </a:lnRef>
+          <a:fillRef idx="3">
+            <a:schemeClr val="accent2"/>
+          </a:fillRef>
+          <a:effectRef idx="3">
+            <a:schemeClr val="accent2"/>
+          </a:effectRef>
+          <a:fontRef idx="minor">
+            <a:schemeClr val="lt1"/>
+          </a:fontRef>
+        </p:style>
+        <p:txBody>
+          <a:bodyPr vert="horz" lIns="91440" tIns="45720" rIns="91440" bIns="45720" rtlCol="0" anchor="ctr">
+            <a:normAutofit fontScale="92500"/>
+          </a:bodyPr>
+          <a:lstStyle>
+            <a:lvl1pPr marL="246888" indent="-246888" algn="l" defTabSz="914400" rtl="0" eaLnBrk="1" latinLnBrk="0" hangingPunct="1">
+              <a:lnSpc>
+                <a:spcPct val="90000"/>
+              </a:lnSpc>
+              <a:spcBef>
+                <a:spcPts val="1400"/>
+              </a:spcBef>
+              <a:buFont typeface="Euphemia" pitchFamily="34" charset="0"/>
+              <a:buChar char="›"/>
+              <a:defRPr sz="2800" kern="1200">
+                <a:solidFill>
+                  <a:schemeClr val="lt1"/>
+                </a:solidFill>
+                <a:latin typeface="+mn-lt"/>
+                <a:ea typeface="+mn-ea"/>
+                <a:cs typeface="+mn-cs"/>
+              </a:defRPr>
+            </a:lvl1pPr>
+            <a:lvl2pPr marL="612648" indent="-246888" algn="l" defTabSz="914400" rtl="0" eaLnBrk="1" latinLnBrk="0" hangingPunct="1">
+              <a:lnSpc>
+                <a:spcPct val="90000"/>
+              </a:lnSpc>
+              <a:spcBef>
+                <a:spcPts val="600"/>
+              </a:spcBef>
+              <a:buFont typeface="Euphemia" pitchFamily="34" charset="0"/>
+              <a:buChar char="–"/>
+              <a:defRPr sz="2400" kern="1200">
+                <a:solidFill>
+                  <a:schemeClr val="lt1"/>
+                </a:solidFill>
+                <a:latin typeface="+mn-lt"/>
+                <a:ea typeface="+mn-ea"/>
+                <a:cs typeface="+mn-cs"/>
+              </a:defRPr>
+            </a:lvl2pPr>
+            <a:lvl3pPr marL="978408" indent="-246888" algn="l" defTabSz="914400" rtl="0" eaLnBrk="1" latinLnBrk="0" hangingPunct="1">
+              <a:lnSpc>
+                <a:spcPct val="90000"/>
+              </a:lnSpc>
+              <a:spcBef>
+                <a:spcPts val="600"/>
+              </a:spcBef>
+              <a:buFont typeface="Euphemia" pitchFamily="34" charset="0"/>
+              <a:buChar char="›"/>
+              <a:defRPr sz="2000" kern="1200">
+                <a:solidFill>
+                  <a:schemeClr val="lt1"/>
+                </a:solidFill>
+                <a:latin typeface="+mn-lt"/>
+                <a:ea typeface="+mn-ea"/>
+                <a:cs typeface="+mn-cs"/>
+              </a:defRPr>
+            </a:lvl3pPr>
+            <a:lvl4pPr marL="1344168" indent="-246888" algn="l" defTabSz="914400" rtl="0" eaLnBrk="1" latinLnBrk="0" hangingPunct="1">
+              <a:lnSpc>
+                <a:spcPct val="90000"/>
+              </a:lnSpc>
+              <a:spcBef>
+                <a:spcPts val="600"/>
+              </a:spcBef>
+              <a:buFont typeface="Arial" pitchFamily="34" charset="0"/>
+              <a:buChar char="–"/>
+              <a:defRPr sz="1800" kern="1200">
+                <a:solidFill>
+                  <a:schemeClr val="lt1"/>
+                </a:solidFill>
+                <a:latin typeface="+mn-lt"/>
+                <a:ea typeface="+mn-ea"/>
+                <a:cs typeface="+mn-cs"/>
+              </a:defRPr>
+            </a:lvl4pPr>
+            <a:lvl5pPr marL="1709928" indent="-246888" algn="l" defTabSz="914400" rtl="0" eaLnBrk="1" latinLnBrk="0" hangingPunct="1">
+              <a:lnSpc>
+                <a:spcPct val="90000"/>
+              </a:lnSpc>
+              <a:spcBef>
+                <a:spcPts val="600"/>
+              </a:spcBef>
+              <a:buFont typeface="Euphemia" pitchFamily="34" charset="0"/>
+              <a:buChar char="›"/>
+              <a:defRPr sz="1800" kern="1200">
+                <a:solidFill>
+                  <a:schemeClr val="lt1"/>
+                </a:solidFill>
+                <a:latin typeface="+mn-lt"/>
+                <a:ea typeface="+mn-ea"/>
+                <a:cs typeface="+mn-cs"/>
+              </a:defRPr>
+            </a:lvl5pPr>
+            <a:lvl6pPr marL="2075688" indent="-246888" algn="l" defTabSz="914400" rtl="0" eaLnBrk="1" latinLnBrk="0" hangingPunct="1">
+              <a:lnSpc>
+                <a:spcPct val="90000"/>
+              </a:lnSpc>
+              <a:spcBef>
+                <a:spcPts val="600"/>
+              </a:spcBef>
+              <a:buFont typeface="Euphemia" pitchFamily="34" charset="0"/>
+              <a:buChar char="–"/>
+              <a:defRPr sz="1800" kern="1200">
+                <a:solidFill>
+                  <a:schemeClr val="lt1"/>
+                </a:solidFill>
+                <a:latin typeface="+mn-lt"/>
+                <a:ea typeface="+mn-ea"/>
+                <a:cs typeface="+mn-cs"/>
+              </a:defRPr>
+            </a:lvl6pPr>
+            <a:lvl7pPr marL="2441448" indent="-246888" algn="l" defTabSz="914400" rtl="0" eaLnBrk="1" latinLnBrk="0" hangingPunct="1">
+              <a:lnSpc>
+                <a:spcPct val="90000"/>
+              </a:lnSpc>
+              <a:spcBef>
+                <a:spcPts val="600"/>
+              </a:spcBef>
+              <a:buFont typeface="Euphemia" pitchFamily="34" charset="0"/>
+              <a:buChar char="›"/>
+              <a:defRPr sz="1800" kern="1200">
+                <a:solidFill>
+                  <a:schemeClr val="lt1"/>
+                </a:solidFill>
+                <a:latin typeface="+mn-lt"/>
+                <a:ea typeface="+mn-ea"/>
+                <a:cs typeface="+mn-cs"/>
+              </a:defRPr>
+            </a:lvl7pPr>
+            <a:lvl8pPr marL="2807208" indent="-246888" algn="l" defTabSz="914400" rtl="0" eaLnBrk="1" latinLnBrk="0" hangingPunct="1">
+              <a:lnSpc>
+                <a:spcPct val="90000"/>
+              </a:lnSpc>
+              <a:spcBef>
+                <a:spcPts val="600"/>
+              </a:spcBef>
+              <a:buFont typeface="Euphemia" pitchFamily="34" charset="0"/>
+              <a:buChar char="–"/>
+              <a:defRPr sz="1800" kern="1200" baseline="0">
+                <a:solidFill>
+                  <a:schemeClr val="lt1"/>
+                </a:solidFill>
+                <a:latin typeface="+mn-lt"/>
+                <a:ea typeface="+mn-ea"/>
+                <a:cs typeface="+mn-cs"/>
+              </a:defRPr>
+            </a:lvl8pPr>
+            <a:lvl9pPr marL="3172968" indent="-246888" algn="l" defTabSz="914400" rtl="0" eaLnBrk="1" latinLnBrk="0" hangingPunct="1">
+              <a:lnSpc>
+                <a:spcPct val="90000"/>
+              </a:lnSpc>
+              <a:spcBef>
+                <a:spcPts val="600"/>
+              </a:spcBef>
+              <a:buFont typeface="Euphemia" pitchFamily="34" charset="0"/>
+              <a:buChar char="›"/>
+              <a:defRPr sz="1800" kern="1200" baseline="0">
+                <a:solidFill>
+                  <a:schemeClr val="lt1"/>
+                </a:solidFill>
+                <a:latin typeface="+mn-lt"/>
+                <a:ea typeface="+mn-ea"/>
+                <a:cs typeface="+mn-cs"/>
+              </a:defRPr>
+            </a:lvl9pPr>
+          </a:lstStyle>
+          <a:p>
+            <a:pPr marL="0" indent="0" algn="ctr">
+              <a:buNone/>
+            </a:pPr>
+            <a:r>
+              <a:rPr lang="en-US" sz="7200" b="1" dirty="0">
+                <a:solidFill>
+                  <a:schemeClr val="tx2">
+                    <a:lumMod val="75000"/>
+                    <a:lumOff val="25000"/>
+                  </a:schemeClr>
+                </a:solidFill>
+              </a:rPr>
+              <a:t>003</a:t>
+            </a:r>
+          </a:p>
+        </p:txBody>
+      </p:sp>
+      <p:sp>
+        <p:nvSpPr>
+          <p:cNvPr id="9" name="Title 12">
+            <a:extLst>
+              <a:ext uri="{FF2B5EF4-FFF2-40B4-BE49-F238E27FC236}">
+                <a16:creationId xmlns:a16="http://schemas.microsoft.com/office/drawing/2014/main" id="{6C29EBE7-FEAF-2F49-8DA0-2F7F3C430023}"/>
+              </a:ext>
+            </a:extLst>
+          </p:cNvPr>
+          <p:cNvSpPr txBox="1">
+            <a:spLocks/>
+          </p:cNvSpPr>
+          <p:nvPr/>
+        </p:nvSpPr>
+        <p:spPr>
+          <a:xfrm>
+            <a:off x="1773932" y="1484783"/>
+            <a:ext cx="9782801" cy="843659"/>
+          </a:xfrm>
+          <a:prstGeom prst="rect">
+            <a:avLst/>
+          </a:prstGeom>
+        </p:spPr>
+        <p:txBody>
+          <a:bodyPr vert="horz" lIns="91440" tIns="45720" rIns="91440" bIns="45720" rtlCol="0" anchor="ctr">
+            <a:normAutofit fontScale="97500"/>
+          </a:bodyPr>
+          <a:lstStyle>
+            <a:lvl1pPr algn="l" defTabSz="914400" rtl="0" eaLnBrk="1" latinLnBrk="0" hangingPunct="1">
+              <a:lnSpc>
+                <a:spcPct val="90000"/>
+              </a:lnSpc>
+              <a:spcBef>
+                <a:spcPct val="0"/>
+              </a:spcBef>
+              <a:buNone/>
+              <a:defRPr sz="3600" kern="1200">
+                <a:solidFill>
+                  <a:schemeClr val="tx1">
+                    <a:lumMod val="75000"/>
+                  </a:schemeClr>
+                </a:solidFill>
+                <a:latin typeface="+mj-lt"/>
+                <a:ea typeface="+mj-ea"/>
+                <a:cs typeface="+mj-cs"/>
+              </a:defRPr>
+            </a:lvl1pPr>
+          </a:lstStyle>
+          <a:p>
+            <a:r>
+              <a:rPr lang="en-US" sz="4800" b="1" dirty="0"/>
+              <a:t>Transform a Square into a Circle</a:t>
+            </a:r>
+          </a:p>
+        </p:txBody>
+      </p:sp>
+      <p:pic>
+        <p:nvPicPr>
+          <p:cNvPr id="3" name="Picture 2">
+            <a:extLst>
+              <a:ext uri="{FF2B5EF4-FFF2-40B4-BE49-F238E27FC236}">
+                <a16:creationId xmlns:a16="http://schemas.microsoft.com/office/drawing/2014/main" id="{50EAF650-6049-341F-83F5-42BBE3193344}"/>
+              </a:ext>
+            </a:extLst>
+          </p:cNvPr>
+          <p:cNvPicPr>
+            <a:picLocks noChangeAspect="1"/>
+          </p:cNvPicPr>
+          <p:nvPr/>
+        </p:nvPicPr>
+        <p:blipFill>
+          <a:blip r:embed="rId4"/>
+          <a:stretch>
+            <a:fillRect/>
+          </a:stretch>
+        </p:blipFill>
+        <p:spPr>
+          <a:xfrm>
+            <a:off x="2748330" y="2290102"/>
+            <a:ext cx="7679623" cy="4478914"/>
+          </a:xfrm>
+          <a:prstGeom prst="rect">
+            <a:avLst/>
+          </a:prstGeom>
+          <a:ln>
+            <a:noFill/>
+          </a:ln>
+          <a:effectLst>
+            <a:outerShdw blurRad="292100" dist="139700" dir="2700000" algn="tl" rotWithShape="0">
+              <a:srgbClr val="333333">
+                <a:alpha val="65000"/>
+              </a:srgbClr>
+            </a:outerShdw>
+          </a:effectLst>
+        </p:spPr>
+      </p:pic>
+    </p:spTree>
+    <p:extLst>
+      <p:ext uri="{BB962C8B-B14F-4D97-AF65-F5344CB8AC3E}">
+        <p14:creationId xmlns:p14="http://schemas.microsoft.com/office/powerpoint/2010/main" val="1202964032"/>
+      </p:ext>
+    </p:extLst>
+  </p:cSld>
+  <p:clrMapOvr>
+    <a:masterClrMapping/>
+  </p:clrMapOvr>
+  <mc:AlternateContent xmlns:mc="http://schemas.openxmlformats.org/markup-compatibility/2006">
+    <mc:Choice xmlns:p14="http://schemas.microsoft.com/office/powerpoint/2010/main" Requires="p14">
+      <p:transition spd="med" p14:dur="700">
+        <p:fade/>
+      </p:transition>
+    </mc:Choice>
+    <mc:Fallback>
+      <p:transition spd="med">
+        <p:fade/>
+      </p:transition>
+    </mc:Fallback>
+  </mc:AlternateContent>
+</p:sld>
+</file>
+
+<file path=ppt/slides/slide4.xml><?xml version="1.0" encoding="utf-8"?>
+<p:sld xmlns:a="http://schemas.openxmlformats.org/drawingml/2006/main" xmlns:r="http://schemas.openxmlformats.org/officeDocument/2006/relationships" xmlns:p="http://schemas.openxmlformats.org/presentationml/2006/main">
+  <p:cSld>
+    <p:spTree>
+      <p:nvGrpSpPr>
+        <p:cNvPr id="1" name="">
+          <a:extLst>
+            <a:ext uri="{FF2B5EF4-FFF2-40B4-BE49-F238E27FC236}">
+              <a16:creationId xmlns:a16="http://schemas.microsoft.com/office/drawing/2014/main" id="{1D7F43D0-1574-7DB5-7181-B26D2D378F3B}"/>
+            </a:ext>
+          </a:extLst>
+        </p:cNvPr>
+        <p:cNvGrpSpPr/>
+        <p:nvPr/>
+      </p:nvGrpSpPr>
+      <p:grpSpPr>
+        <a:xfrm>
+          <a:off x="0" y="0"/>
+          <a:ext cx="0" cy="0"/>
+          <a:chOff x="0" y="0"/>
+          <a:chExt cx="0" cy="0"/>
+        </a:xfrm>
+      </p:grpSpPr>
+      <p:sp>
+        <p:nvSpPr>
+          <p:cNvPr id="13" name="Title 12">
+            <a:extLst>
+              <a:ext uri="{FF2B5EF4-FFF2-40B4-BE49-F238E27FC236}">
+                <a16:creationId xmlns:a16="http://schemas.microsoft.com/office/drawing/2014/main" id="{21578DAD-B9A7-8F02-1098-AC094FE9FD1C}"/>
+              </a:ext>
+            </a:extLst>
+          </p:cNvPr>
+          <p:cNvSpPr>
+            <a:spLocks noGrp="1"/>
+          </p:cNvSpPr>
+          <p:nvPr>
+            <p:ph type="title"/>
+          </p:nvPr>
+        </p:nvSpPr>
+        <p:spPr>
+          <a:xfrm>
+            <a:off x="1593436" y="260649"/>
+            <a:ext cx="6174521" cy="864096"/>
+          </a:xfrm>
+        </p:spPr>
+        <p:txBody>
+          <a:bodyPr anchor="ctr">
+            <a:normAutofit fontScale="90000"/>
+          </a:bodyPr>
+          <a:lstStyle/>
+          <a:p>
+            <a:r>
+              <a:rPr lang="en-US" sz="6000" b="1" dirty="0">
+                <a:latin typeface="ADLaM Display" panose="02010000000000000000" pitchFamily="2" charset="0"/>
+                <a:ea typeface="ADLaM Display" panose="02010000000000000000" pitchFamily="2" charset="0"/>
+                <a:cs typeface="ADLaM Display" panose="02010000000000000000" pitchFamily="2" charset="0"/>
+              </a:rPr>
+              <a:t>Learning Manim</a:t>
+            </a:r>
+          </a:p>
+        </p:txBody>
+      </p:sp>
+      <p:pic>
+        <p:nvPicPr>
+          <p:cNvPr id="4" name="Picture 3">
+            <a:extLst>
+              <a:ext uri="{FF2B5EF4-FFF2-40B4-BE49-F238E27FC236}">
+                <a16:creationId xmlns:a16="http://schemas.microsoft.com/office/drawing/2014/main" id="{40A67585-7281-B878-C7A7-8BA539EE7D54}"/>
+              </a:ext>
+            </a:extLst>
+          </p:cNvPr>
+          <p:cNvPicPr>
+            <a:picLocks noChangeAspect="1"/>
+          </p:cNvPicPr>
+          <p:nvPr/>
+        </p:nvPicPr>
+        <p:blipFill>
+          <a:blip r:embed="rId2"/>
+          <a:stretch>
+            <a:fillRect/>
+          </a:stretch>
+        </p:blipFill>
+        <p:spPr>
+          <a:xfrm>
+            <a:off x="7767957" y="83058"/>
+            <a:ext cx="4420868" cy="1512168"/>
+          </a:xfrm>
+          <a:prstGeom prst="rect">
+            <a:avLst/>
+          </a:prstGeom>
+        </p:spPr>
+      </p:pic>
+      <p:pic>
+        <p:nvPicPr>
+          <p:cNvPr id="5" name="Picture 4">
+            <a:extLst>
+              <a:ext uri="{FF2B5EF4-FFF2-40B4-BE49-F238E27FC236}">
+                <a16:creationId xmlns:a16="http://schemas.microsoft.com/office/drawing/2014/main" id="{88889169-6C2B-0713-327F-2320B20BC227}"/>
+              </a:ext>
+            </a:extLst>
+          </p:cNvPr>
+          <p:cNvPicPr>
+            <a:picLocks noChangeAspect="1"/>
+          </p:cNvPicPr>
+          <p:nvPr/>
+        </p:nvPicPr>
+        <p:blipFill>
+          <a:blip r:embed="rId3"/>
+          <a:stretch>
+            <a:fillRect/>
+          </a:stretch>
+        </p:blipFill>
+        <p:spPr>
+          <a:xfrm>
+            <a:off x="117748" y="5589240"/>
+            <a:ext cx="1152128" cy="1180931"/>
+          </a:xfrm>
+          <a:prstGeom prst="rect">
+            <a:avLst/>
+          </a:prstGeom>
+          <a:ln>
+            <a:noFill/>
+          </a:ln>
+          <a:effectLst>
+            <a:softEdge rad="112500"/>
+          </a:effectLst>
+        </p:spPr>
+      </p:pic>
+      <p:sp>
+        <p:nvSpPr>
+          <p:cNvPr id="6" name="Subtitle 2">
+            <a:extLst>
+              <a:ext uri="{FF2B5EF4-FFF2-40B4-BE49-F238E27FC236}">
+                <a16:creationId xmlns:a16="http://schemas.microsoft.com/office/drawing/2014/main" id="{96559BCC-CDCB-3A7D-8C79-D51CDA5A2FB4}"/>
+              </a:ext>
+            </a:extLst>
+          </p:cNvPr>
+          <p:cNvSpPr txBox="1">
+            <a:spLocks/>
+          </p:cNvSpPr>
+          <p:nvPr/>
+        </p:nvSpPr>
+        <p:spPr>
+          <a:xfrm>
+            <a:off x="-1022" y="1484784"/>
+            <a:ext cx="1701923" cy="1368152"/>
+          </a:xfrm>
+          <a:prstGeom prst="rect">
+            <a:avLst/>
+          </a:prstGeom>
+        </p:spPr>
+        <p:style>
+          <a:lnRef idx="0">
+            <a:schemeClr val="accent2"/>
+          </a:lnRef>
+          <a:fillRef idx="3">
+            <a:schemeClr val="accent2"/>
+          </a:fillRef>
+          <a:effectRef idx="3">
+            <a:schemeClr val="accent2"/>
+          </a:effectRef>
+          <a:fontRef idx="minor">
+            <a:schemeClr val="lt1"/>
+          </a:fontRef>
+        </p:style>
+        <p:txBody>
+          <a:bodyPr vert="horz" lIns="91440" tIns="45720" rIns="91440" bIns="45720" rtlCol="0" anchor="ctr">
+            <a:normAutofit fontScale="92500"/>
+          </a:bodyPr>
+          <a:lstStyle>
+            <a:lvl1pPr marL="246888" indent="-246888" algn="l" defTabSz="914400" rtl="0" eaLnBrk="1" latinLnBrk="0" hangingPunct="1">
+              <a:lnSpc>
+                <a:spcPct val="90000"/>
+              </a:lnSpc>
+              <a:spcBef>
+                <a:spcPts val="1400"/>
+              </a:spcBef>
+              <a:buFont typeface="Euphemia" pitchFamily="34" charset="0"/>
+              <a:buChar char="›"/>
+              <a:defRPr sz="2800" kern="1200">
+                <a:solidFill>
+                  <a:schemeClr val="lt1"/>
+                </a:solidFill>
+                <a:latin typeface="+mn-lt"/>
+                <a:ea typeface="+mn-ea"/>
+                <a:cs typeface="+mn-cs"/>
+              </a:defRPr>
+            </a:lvl1pPr>
+            <a:lvl2pPr marL="612648" indent="-246888" algn="l" defTabSz="914400" rtl="0" eaLnBrk="1" latinLnBrk="0" hangingPunct="1">
+              <a:lnSpc>
+                <a:spcPct val="90000"/>
+              </a:lnSpc>
+              <a:spcBef>
+                <a:spcPts val="600"/>
+              </a:spcBef>
+              <a:buFont typeface="Euphemia" pitchFamily="34" charset="0"/>
+              <a:buChar char="–"/>
+              <a:defRPr sz="2400" kern="1200">
+                <a:solidFill>
+                  <a:schemeClr val="lt1"/>
+                </a:solidFill>
+                <a:latin typeface="+mn-lt"/>
+                <a:ea typeface="+mn-ea"/>
+                <a:cs typeface="+mn-cs"/>
+              </a:defRPr>
+            </a:lvl2pPr>
+            <a:lvl3pPr marL="978408" indent="-246888" algn="l" defTabSz="914400" rtl="0" eaLnBrk="1" latinLnBrk="0" hangingPunct="1">
+              <a:lnSpc>
+                <a:spcPct val="90000"/>
+              </a:lnSpc>
+              <a:spcBef>
+                <a:spcPts val="600"/>
+              </a:spcBef>
+              <a:buFont typeface="Euphemia" pitchFamily="34" charset="0"/>
+              <a:buChar char="›"/>
+              <a:defRPr sz="2000" kern="1200">
+                <a:solidFill>
+                  <a:schemeClr val="lt1"/>
+                </a:solidFill>
+                <a:latin typeface="+mn-lt"/>
+                <a:ea typeface="+mn-ea"/>
+                <a:cs typeface="+mn-cs"/>
+              </a:defRPr>
+            </a:lvl3pPr>
+            <a:lvl4pPr marL="1344168" indent="-246888" algn="l" defTabSz="914400" rtl="0" eaLnBrk="1" latinLnBrk="0" hangingPunct="1">
+              <a:lnSpc>
+                <a:spcPct val="90000"/>
+              </a:lnSpc>
+              <a:spcBef>
+                <a:spcPts val="600"/>
+              </a:spcBef>
+              <a:buFont typeface="Arial" pitchFamily="34" charset="0"/>
+              <a:buChar char="–"/>
+              <a:defRPr sz="1800" kern="1200">
+                <a:solidFill>
+                  <a:schemeClr val="lt1"/>
+                </a:solidFill>
+                <a:latin typeface="+mn-lt"/>
+                <a:ea typeface="+mn-ea"/>
+                <a:cs typeface="+mn-cs"/>
+              </a:defRPr>
+            </a:lvl4pPr>
+            <a:lvl5pPr marL="1709928" indent="-246888" algn="l" defTabSz="914400" rtl="0" eaLnBrk="1" latinLnBrk="0" hangingPunct="1">
+              <a:lnSpc>
+                <a:spcPct val="90000"/>
+              </a:lnSpc>
+              <a:spcBef>
+                <a:spcPts val="600"/>
+              </a:spcBef>
+              <a:buFont typeface="Euphemia" pitchFamily="34" charset="0"/>
+              <a:buChar char="›"/>
+              <a:defRPr sz="1800" kern="1200">
+                <a:solidFill>
+                  <a:schemeClr val="lt1"/>
+                </a:solidFill>
+                <a:latin typeface="+mn-lt"/>
+                <a:ea typeface="+mn-ea"/>
+                <a:cs typeface="+mn-cs"/>
+              </a:defRPr>
+            </a:lvl5pPr>
+            <a:lvl6pPr marL="2075688" indent="-246888" algn="l" defTabSz="914400" rtl="0" eaLnBrk="1" latinLnBrk="0" hangingPunct="1">
+              <a:lnSpc>
+                <a:spcPct val="90000"/>
+              </a:lnSpc>
+              <a:spcBef>
+                <a:spcPts val="600"/>
+              </a:spcBef>
+              <a:buFont typeface="Euphemia" pitchFamily="34" charset="0"/>
+              <a:buChar char="–"/>
+              <a:defRPr sz="1800" kern="1200">
+                <a:solidFill>
+                  <a:schemeClr val="lt1"/>
+                </a:solidFill>
+                <a:latin typeface="+mn-lt"/>
+                <a:ea typeface="+mn-ea"/>
+                <a:cs typeface="+mn-cs"/>
+              </a:defRPr>
+            </a:lvl6pPr>
+            <a:lvl7pPr marL="2441448" indent="-246888" algn="l" defTabSz="914400" rtl="0" eaLnBrk="1" latinLnBrk="0" hangingPunct="1">
+              <a:lnSpc>
+                <a:spcPct val="90000"/>
+              </a:lnSpc>
+              <a:spcBef>
+                <a:spcPts val="600"/>
+              </a:spcBef>
+              <a:buFont typeface="Euphemia" pitchFamily="34" charset="0"/>
+              <a:buChar char="›"/>
+              <a:defRPr sz="1800" kern="1200">
+                <a:solidFill>
+                  <a:schemeClr val="lt1"/>
+                </a:solidFill>
+                <a:latin typeface="+mn-lt"/>
+                <a:ea typeface="+mn-ea"/>
+                <a:cs typeface="+mn-cs"/>
+              </a:defRPr>
+            </a:lvl7pPr>
+            <a:lvl8pPr marL="2807208" indent="-246888" algn="l" defTabSz="914400" rtl="0" eaLnBrk="1" latinLnBrk="0" hangingPunct="1">
+              <a:lnSpc>
+                <a:spcPct val="90000"/>
+              </a:lnSpc>
+              <a:spcBef>
+                <a:spcPts val="600"/>
+              </a:spcBef>
+              <a:buFont typeface="Euphemia" pitchFamily="34" charset="0"/>
+              <a:buChar char="–"/>
+              <a:defRPr sz="1800" kern="1200" baseline="0">
+                <a:solidFill>
+                  <a:schemeClr val="lt1"/>
+                </a:solidFill>
+                <a:latin typeface="+mn-lt"/>
+                <a:ea typeface="+mn-ea"/>
+                <a:cs typeface="+mn-cs"/>
+              </a:defRPr>
+            </a:lvl8pPr>
+            <a:lvl9pPr marL="3172968" indent="-246888" algn="l" defTabSz="914400" rtl="0" eaLnBrk="1" latinLnBrk="0" hangingPunct="1">
+              <a:lnSpc>
+                <a:spcPct val="90000"/>
+              </a:lnSpc>
+              <a:spcBef>
+                <a:spcPts val="600"/>
+              </a:spcBef>
+              <a:buFont typeface="Euphemia" pitchFamily="34" charset="0"/>
+              <a:buChar char="›"/>
+              <a:defRPr sz="1800" kern="1200" baseline="0">
+                <a:solidFill>
+                  <a:schemeClr val="lt1"/>
+                </a:solidFill>
+                <a:latin typeface="+mn-lt"/>
+                <a:ea typeface="+mn-ea"/>
+                <a:cs typeface="+mn-cs"/>
+              </a:defRPr>
+            </a:lvl9pPr>
+          </a:lstStyle>
+          <a:p>
+            <a:pPr marL="0" indent="0" algn="ctr">
+              <a:buNone/>
+            </a:pPr>
+            <a:r>
+              <a:rPr lang="en-US" sz="7200" b="1" dirty="0">
+                <a:solidFill>
+                  <a:schemeClr val="tx2">
+                    <a:lumMod val="75000"/>
+                    <a:lumOff val="25000"/>
+                  </a:schemeClr>
+                </a:solidFill>
+              </a:rPr>
+              <a:t>004</a:t>
+            </a:r>
+          </a:p>
+        </p:txBody>
+      </p:sp>
+      <p:sp>
+        <p:nvSpPr>
+          <p:cNvPr id="9" name="Title 12">
+            <a:extLst>
+              <a:ext uri="{FF2B5EF4-FFF2-40B4-BE49-F238E27FC236}">
+                <a16:creationId xmlns:a16="http://schemas.microsoft.com/office/drawing/2014/main" id="{7DA07B10-B4C0-12BC-D654-90D18613A115}"/>
+              </a:ext>
+            </a:extLst>
+          </p:cNvPr>
+          <p:cNvSpPr txBox="1">
+            <a:spLocks/>
+          </p:cNvSpPr>
+          <p:nvPr/>
+        </p:nvSpPr>
+        <p:spPr>
+          <a:xfrm>
+            <a:off x="1773932" y="1484783"/>
+            <a:ext cx="9782801" cy="843659"/>
+          </a:xfrm>
+          <a:prstGeom prst="rect">
+            <a:avLst/>
+          </a:prstGeom>
+        </p:spPr>
+        <p:txBody>
+          <a:bodyPr vert="horz" lIns="91440" tIns="45720" rIns="91440" bIns="45720" rtlCol="0" anchor="ctr">
+            <a:normAutofit fontScale="97500"/>
+          </a:bodyPr>
+          <a:lstStyle>
+            <a:lvl1pPr algn="l" defTabSz="914400" rtl="0" eaLnBrk="1" latinLnBrk="0" hangingPunct="1">
+              <a:lnSpc>
+                <a:spcPct val="90000"/>
+              </a:lnSpc>
+              <a:spcBef>
+                <a:spcPct val="0"/>
+              </a:spcBef>
+              <a:buNone/>
+              <a:defRPr sz="3600" kern="1200">
+                <a:solidFill>
+                  <a:schemeClr val="tx1">
+                    <a:lumMod val="75000"/>
+                  </a:schemeClr>
+                </a:solidFill>
+                <a:latin typeface="+mj-lt"/>
+                <a:ea typeface="+mj-ea"/>
+                <a:cs typeface="+mj-cs"/>
+              </a:defRPr>
+            </a:lvl1pPr>
+          </a:lstStyle>
+          <a:p>
+            <a:r>
+              <a:rPr lang="en-US" sz="4800" b="1" dirty="0"/>
+              <a:t>Positioning MobjectS</a:t>
+            </a:r>
+          </a:p>
+        </p:txBody>
+      </p:sp>
+      <p:pic>
+        <p:nvPicPr>
+          <p:cNvPr id="7" name="Picture 6">
+            <a:extLst>
+              <a:ext uri="{FF2B5EF4-FFF2-40B4-BE49-F238E27FC236}">
+                <a16:creationId xmlns:a16="http://schemas.microsoft.com/office/drawing/2014/main" id="{9B1A7B67-AA39-317B-70A3-C62047D0E04F}"/>
+              </a:ext>
+            </a:extLst>
+          </p:cNvPr>
+          <p:cNvPicPr>
+            <a:picLocks noChangeAspect="1"/>
+          </p:cNvPicPr>
+          <p:nvPr/>
+        </p:nvPicPr>
+        <p:blipFill>
+          <a:blip r:embed="rId4"/>
+          <a:stretch>
+            <a:fillRect/>
+          </a:stretch>
+        </p:blipFill>
+        <p:spPr>
+          <a:xfrm>
+            <a:off x="2490440" y="2328442"/>
+            <a:ext cx="7463599" cy="4352924"/>
+          </a:xfrm>
+          <a:prstGeom prst="rect">
+            <a:avLst/>
+          </a:prstGeom>
+          <a:ln>
+            <a:noFill/>
+          </a:ln>
+          <a:effectLst>
+            <a:outerShdw blurRad="292100" dist="139700" dir="2700000" algn="tl" rotWithShape="0">
+              <a:srgbClr val="333333">
+                <a:alpha val="65000"/>
+              </a:srgbClr>
+            </a:outerShdw>
+          </a:effectLst>
+        </p:spPr>
+      </p:pic>
+    </p:spTree>
+    <p:extLst>
+      <p:ext uri="{BB962C8B-B14F-4D97-AF65-F5344CB8AC3E}">
+        <p14:creationId xmlns:p14="http://schemas.microsoft.com/office/powerpoint/2010/main" val="3984021197"/>
+      </p:ext>
+    </p:extLst>
+  </p:cSld>
+  <p:clrMapOvr>
+    <a:masterClrMapping/>
+  </p:clrMapOvr>
+  <mc:AlternateContent xmlns:mc="http://schemas.openxmlformats.org/markup-compatibility/2006">
+    <mc:Choice xmlns:p14="http://schemas.microsoft.com/office/powerpoint/2010/main" Requires="p14">
+      <p:transition spd="med" p14:dur="700">
+        <p:fade/>
+      </p:transition>
+    </mc:Choice>
+    <mc:Fallback>
       <p:transition spd="med">
         <p:fade/>
       </p:transition>

</xml_diff>

<commit_message>
Update Learn Manim Library by Practice.pptx
</commit_message>
<xml_diff>
--- a/Manim/Learn Manim Library by Practice.pptx
+++ b/Manim/Learn Manim Library by Practice.pptx
@@ -5,10 +5,10 @@
     <p:sldMasterId id="2147483648" r:id="rId1"/>
   </p:sldMasterIdLst>
   <p:notesMasterIdLst>
-    <p:notesMasterId r:id="rId7"/>
+    <p:notesMasterId r:id="rId14"/>
   </p:notesMasterIdLst>
   <p:handoutMasterIdLst>
-    <p:handoutMasterId r:id="rId8"/>
+    <p:handoutMasterId r:id="rId15"/>
   </p:handoutMasterIdLst>
   <p:sldIdLst>
     <p:sldId id="256" r:id="rId2"/>
@@ -16,6 +16,13 @@
     <p:sldId id="268" r:id="rId4"/>
     <p:sldId id="269" r:id="rId5"/>
     <p:sldId id="270" r:id="rId6"/>
+    <p:sldId id="271" r:id="rId7"/>
+    <p:sldId id="273" r:id="rId8"/>
+    <p:sldId id="274" r:id="rId9"/>
+    <p:sldId id="275" r:id="rId10"/>
+    <p:sldId id="276" r:id="rId11"/>
+    <p:sldId id="277" r:id="rId12"/>
+    <p:sldId id="272" r:id="rId13"/>
   </p:sldIdLst>
   <p:sldSz cx="12188825" cy="6858000"/>
   <p:notesSz cx="6858000" cy="9144000"/>
@@ -115,6 +122,30 @@
     </a:lvl9pPr>
   </p:defaultTextStyle>
   <p:extLst>
+    <p:ext uri="{521415D9-36F7-43E2-AB2F-B90AF26B5E84}">
+      <p14:sectionLst xmlns:p14="http://schemas.microsoft.com/office/powerpoint/2010/main">
+        <p14:section name="Default Section" id="{31C25DE4-BCB6-4E87-9795-4A924227221D}">
+          <p14:sldIdLst>
+            <p14:sldId id="256"/>
+            <p14:sldId id="267"/>
+            <p14:sldId id="268"/>
+            <p14:sldId id="269"/>
+            <p14:sldId id="270"/>
+            <p14:sldId id="271"/>
+            <p14:sldId id="273"/>
+            <p14:sldId id="274"/>
+            <p14:sldId id="275"/>
+            <p14:sldId id="276"/>
+            <p14:sldId id="277"/>
+          </p14:sldIdLst>
+        </p14:section>
+        <p14:section name="Udemy" id="{61D4A0FB-23D1-4A58-B3C6-86E5BDFA3F31}">
+          <p14:sldIdLst>
+            <p14:sldId id="272"/>
+          </p14:sldIdLst>
+        </p14:section>
+      </p14:sectionLst>
+    </p:ext>
     <p:ext uri="{EFAFB233-063F-42B5-8137-9DF3F51BA10A}">
       <p15:sldGuideLst xmlns:p15="http://schemas.microsoft.com/office/powerpoint/2012/main">
         <p15:guide id="1" orient="horz" pos="2160">
@@ -7771,6 +7802,1184 @@
 </p:sld>
 </file>
 
+<file path=ppt/slides/slide10.xml><?xml version="1.0" encoding="utf-8"?>
+<p:sld xmlns:a="http://schemas.openxmlformats.org/drawingml/2006/main" xmlns:r="http://schemas.openxmlformats.org/officeDocument/2006/relationships" xmlns:p="http://schemas.openxmlformats.org/presentationml/2006/main">
+  <p:cSld>
+    <p:spTree>
+      <p:nvGrpSpPr>
+        <p:cNvPr id="1" name="">
+          <a:extLst>
+            <a:ext uri="{FF2B5EF4-FFF2-40B4-BE49-F238E27FC236}">
+              <a16:creationId xmlns:a16="http://schemas.microsoft.com/office/drawing/2014/main" id="{C33898AC-2BCA-F8C5-9D72-14C86A4F1A17}"/>
+            </a:ext>
+          </a:extLst>
+        </p:cNvPr>
+        <p:cNvGrpSpPr/>
+        <p:nvPr/>
+      </p:nvGrpSpPr>
+      <p:grpSpPr>
+        <a:xfrm>
+          <a:off x="0" y="0"/>
+          <a:ext cx="0" cy="0"/>
+          <a:chOff x="0" y="0"/>
+          <a:chExt cx="0" cy="0"/>
+        </a:xfrm>
+      </p:grpSpPr>
+      <p:sp>
+        <p:nvSpPr>
+          <p:cNvPr id="13" name="Title 12">
+            <a:extLst>
+              <a:ext uri="{FF2B5EF4-FFF2-40B4-BE49-F238E27FC236}">
+                <a16:creationId xmlns:a16="http://schemas.microsoft.com/office/drawing/2014/main" id="{A3B99D8C-9C86-CC2F-1571-0AF29872C7BA}"/>
+              </a:ext>
+            </a:extLst>
+          </p:cNvPr>
+          <p:cNvSpPr>
+            <a:spLocks noGrp="1"/>
+          </p:cNvSpPr>
+          <p:nvPr>
+            <p:ph type="title"/>
+          </p:nvPr>
+        </p:nvSpPr>
+        <p:spPr>
+          <a:xfrm>
+            <a:off x="1593436" y="260649"/>
+            <a:ext cx="6174521" cy="864096"/>
+          </a:xfrm>
+        </p:spPr>
+        <p:txBody>
+          <a:bodyPr anchor="ctr">
+            <a:normAutofit fontScale="90000"/>
+          </a:bodyPr>
+          <a:lstStyle/>
+          <a:p>
+            <a:r>
+              <a:rPr lang="en-US" sz="6000" b="1" dirty="0">
+                <a:latin typeface="ADLaM Display" panose="02010000000000000000" pitchFamily="2" charset="0"/>
+                <a:ea typeface="ADLaM Display" panose="02010000000000000000" pitchFamily="2" charset="0"/>
+                <a:cs typeface="ADLaM Display" panose="02010000000000000000" pitchFamily="2" charset="0"/>
+              </a:rPr>
+              <a:t>Learning Manim</a:t>
+            </a:r>
+          </a:p>
+        </p:txBody>
+      </p:sp>
+      <p:pic>
+        <p:nvPicPr>
+          <p:cNvPr id="4" name="Picture 3">
+            <a:extLst>
+              <a:ext uri="{FF2B5EF4-FFF2-40B4-BE49-F238E27FC236}">
+                <a16:creationId xmlns:a16="http://schemas.microsoft.com/office/drawing/2014/main" id="{C0D53430-BE0B-F7F9-29BF-C83CAF6B79ED}"/>
+              </a:ext>
+            </a:extLst>
+          </p:cNvPr>
+          <p:cNvPicPr>
+            <a:picLocks noChangeAspect="1"/>
+          </p:cNvPicPr>
+          <p:nvPr/>
+        </p:nvPicPr>
+        <p:blipFill>
+          <a:blip r:embed="rId2"/>
+          <a:stretch>
+            <a:fillRect/>
+          </a:stretch>
+        </p:blipFill>
+        <p:spPr>
+          <a:xfrm>
+            <a:off x="7767957" y="83058"/>
+            <a:ext cx="4420868" cy="1512168"/>
+          </a:xfrm>
+          <a:prstGeom prst="rect">
+            <a:avLst/>
+          </a:prstGeom>
+        </p:spPr>
+      </p:pic>
+      <p:pic>
+        <p:nvPicPr>
+          <p:cNvPr id="5" name="Picture 4">
+            <a:extLst>
+              <a:ext uri="{FF2B5EF4-FFF2-40B4-BE49-F238E27FC236}">
+                <a16:creationId xmlns:a16="http://schemas.microsoft.com/office/drawing/2014/main" id="{8CCB357B-CADC-6F6A-E801-F7D91BAFC98A}"/>
+              </a:ext>
+            </a:extLst>
+          </p:cNvPr>
+          <p:cNvPicPr>
+            <a:picLocks noChangeAspect="1"/>
+          </p:cNvPicPr>
+          <p:nvPr/>
+        </p:nvPicPr>
+        <p:blipFill>
+          <a:blip r:embed="rId3"/>
+          <a:stretch>
+            <a:fillRect/>
+          </a:stretch>
+        </p:blipFill>
+        <p:spPr>
+          <a:xfrm>
+            <a:off x="117748" y="5589240"/>
+            <a:ext cx="1152128" cy="1180931"/>
+          </a:xfrm>
+          <a:prstGeom prst="rect">
+            <a:avLst/>
+          </a:prstGeom>
+          <a:ln>
+            <a:noFill/>
+          </a:ln>
+          <a:effectLst>
+            <a:softEdge rad="112500"/>
+          </a:effectLst>
+        </p:spPr>
+      </p:pic>
+      <p:sp>
+        <p:nvSpPr>
+          <p:cNvPr id="6" name="Subtitle 2">
+            <a:extLst>
+              <a:ext uri="{FF2B5EF4-FFF2-40B4-BE49-F238E27FC236}">
+                <a16:creationId xmlns:a16="http://schemas.microsoft.com/office/drawing/2014/main" id="{6F5582DE-161D-DD28-D3D4-BE3AADCB27B4}"/>
+              </a:ext>
+            </a:extLst>
+          </p:cNvPr>
+          <p:cNvSpPr txBox="1">
+            <a:spLocks/>
+          </p:cNvSpPr>
+          <p:nvPr/>
+        </p:nvSpPr>
+        <p:spPr>
+          <a:xfrm>
+            <a:off x="-1022" y="1484784"/>
+            <a:ext cx="1701923" cy="1368152"/>
+          </a:xfrm>
+          <a:prstGeom prst="rect">
+            <a:avLst/>
+          </a:prstGeom>
+        </p:spPr>
+        <p:style>
+          <a:lnRef idx="0">
+            <a:schemeClr val="accent2"/>
+          </a:lnRef>
+          <a:fillRef idx="3">
+            <a:schemeClr val="accent2"/>
+          </a:fillRef>
+          <a:effectRef idx="3">
+            <a:schemeClr val="accent2"/>
+          </a:effectRef>
+          <a:fontRef idx="minor">
+            <a:schemeClr val="lt1"/>
+          </a:fontRef>
+        </p:style>
+        <p:txBody>
+          <a:bodyPr vert="horz" lIns="91440" tIns="45720" rIns="91440" bIns="45720" rtlCol="0" anchor="ctr">
+            <a:normAutofit fontScale="92500"/>
+          </a:bodyPr>
+          <a:lstStyle>
+            <a:lvl1pPr marL="246888" indent="-246888" algn="l" defTabSz="914400" rtl="0" eaLnBrk="1" latinLnBrk="0" hangingPunct="1">
+              <a:lnSpc>
+                <a:spcPct val="90000"/>
+              </a:lnSpc>
+              <a:spcBef>
+                <a:spcPts val="1400"/>
+              </a:spcBef>
+              <a:buFont typeface="Euphemia" pitchFamily="34" charset="0"/>
+              <a:buChar char="›"/>
+              <a:defRPr sz="2800" kern="1200">
+                <a:solidFill>
+                  <a:schemeClr val="lt1"/>
+                </a:solidFill>
+                <a:latin typeface="+mn-lt"/>
+                <a:ea typeface="+mn-ea"/>
+                <a:cs typeface="+mn-cs"/>
+              </a:defRPr>
+            </a:lvl1pPr>
+            <a:lvl2pPr marL="612648" indent="-246888" algn="l" defTabSz="914400" rtl="0" eaLnBrk="1" latinLnBrk="0" hangingPunct="1">
+              <a:lnSpc>
+                <a:spcPct val="90000"/>
+              </a:lnSpc>
+              <a:spcBef>
+                <a:spcPts val="600"/>
+              </a:spcBef>
+              <a:buFont typeface="Euphemia" pitchFamily="34" charset="0"/>
+              <a:buChar char="–"/>
+              <a:defRPr sz="2400" kern="1200">
+                <a:solidFill>
+                  <a:schemeClr val="lt1"/>
+                </a:solidFill>
+                <a:latin typeface="+mn-lt"/>
+                <a:ea typeface="+mn-ea"/>
+                <a:cs typeface="+mn-cs"/>
+              </a:defRPr>
+            </a:lvl2pPr>
+            <a:lvl3pPr marL="978408" indent="-246888" algn="l" defTabSz="914400" rtl="0" eaLnBrk="1" latinLnBrk="0" hangingPunct="1">
+              <a:lnSpc>
+                <a:spcPct val="90000"/>
+              </a:lnSpc>
+              <a:spcBef>
+                <a:spcPts val="600"/>
+              </a:spcBef>
+              <a:buFont typeface="Euphemia" pitchFamily="34" charset="0"/>
+              <a:buChar char="›"/>
+              <a:defRPr sz="2000" kern="1200">
+                <a:solidFill>
+                  <a:schemeClr val="lt1"/>
+                </a:solidFill>
+                <a:latin typeface="+mn-lt"/>
+                <a:ea typeface="+mn-ea"/>
+                <a:cs typeface="+mn-cs"/>
+              </a:defRPr>
+            </a:lvl3pPr>
+            <a:lvl4pPr marL="1344168" indent="-246888" algn="l" defTabSz="914400" rtl="0" eaLnBrk="1" latinLnBrk="0" hangingPunct="1">
+              <a:lnSpc>
+                <a:spcPct val="90000"/>
+              </a:lnSpc>
+              <a:spcBef>
+                <a:spcPts val="600"/>
+              </a:spcBef>
+              <a:buFont typeface="Arial" pitchFamily="34" charset="0"/>
+              <a:buChar char="–"/>
+              <a:defRPr sz="1800" kern="1200">
+                <a:solidFill>
+                  <a:schemeClr val="lt1"/>
+                </a:solidFill>
+                <a:latin typeface="+mn-lt"/>
+                <a:ea typeface="+mn-ea"/>
+                <a:cs typeface="+mn-cs"/>
+              </a:defRPr>
+            </a:lvl4pPr>
+            <a:lvl5pPr marL="1709928" indent="-246888" algn="l" defTabSz="914400" rtl="0" eaLnBrk="1" latinLnBrk="0" hangingPunct="1">
+              <a:lnSpc>
+                <a:spcPct val="90000"/>
+              </a:lnSpc>
+              <a:spcBef>
+                <a:spcPts val="600"/>
+              </a:spcBef>
+              <a:buFont typeface="Euphemia" pitchFamily="34" charset="0"/>
+              <a:buChar char="›"/>
+              <a:defRPr sz="1800" kern="1200">
+                <a:solidFill>
+                  <a:schemeClr val="lt1"/>
+                </a:solidFill>
+                <a:latin typeface="+mn-lt"/>
+                <a:ea typeface="+mn-ea"/>
+                <a:cs typeface="+mn-cs"/>
+              </a:defRPr>
+            </a:lvl5pPr>
+            <a:lvl6pPr marL="2075688" indent="-246888" algn="l" defTabSz="914400" rtl="0" eaLnBrk="1" latinLnBrk="0" hangingPunct="1">
+              <a:lnSpc>
+                <a:spcPct val="90000"/>
+              </a:lnSpc>
+              <a:spcBef>
+                <a:spcPts val="600"/>
+              </a:spcBef>
+              <a:buFont typeface="Euphemia" pitchFamily="34" charset="0"/>
+              <a:buChar char="–"/>
+              <a:defRPr sz="1800" kern="1200">
+                <a:solidFill>
+                  <a:schemeClr val="lt1"/>
+                </a:solidFill>
+                <a:latin typeface="+mn-lt"/>
+                <a:ea typeface="+mn-ea"/>
+                <a:cs typeface="+mn-cs"/>
+              </a:defRPr>
+            </a:lvl6pPr>
+            <a:lvl7pPr marL="2441448" indent="-246888" algn="l" defTabSz="914400" rtl="0" eaLnBrk="1" latinLnBrk="0" hangingPunct="1">
+              <a:lnSpc>
+                <a:spcPct val="90000"/>
+              </a:lnSpc>
+              <a:spcBef>
+                <a:spcPts val="600"/>
+              </a:spcBef>
+              <a:buFont typeface="Euphemia" pitchFamily="34" charset="0"/>
+              <a:buChar char="›"/>
+              <a:defRPr sz="1800" kern="1200">
+                <a:solidFill>
+                  <a:schemeClr val="lt1"/>
+                </a:solidFill>
+                <a:latin typeface="+mn-lt"/>
+                <a:ea typeface="+mn-ea"/>
+                <a:cs typeface="+mn-cs"/>
+              </a:defRPr>
+            </a:lvl7pPr>
+            <a:lvl8pPr marL="2807208" indent="-246888" algn="l" defTabSz="914400" rtl="0" eaLnBrk="1" latinLnBrk="0" hangingPunct="1">
+              <a:lnSpc>
+                <a:spcPct val="90000"/>
+              </a:lnSpc>
+              <a:spcBef>
+                <a:spcPts val="600"/>
+              </a:spcBef>
+              <a:buFont typeface="Euphemia" pitchFamily="34" charset="0"/>
+              <a:buChar char="–"/>
+              <a:defRPr sz="1800" kern="1200" baseline="0">
+                <a:solidFill>
+                  <a:schemeClr val="lt1"/>
+                </a:solidFill>
+                <a:latin typeface="+mn-lt"/>
+                <a:ea typeface="+mn-ea"/>
+                <a:cs typeface="+mn-cs"/>
+              </a:defRPr>
+            </a:lvl8pPr>
+            <a:lvl9pPr marL="3172968" indent="-246888" algn="l" defTabSz="914400" rtl="0" eaLnBrk="1" latinLnBrk="0" hangingPunct="1">
+              <a:lnSpc>
+                <a:spcPct val="90000"/>
+              </a:lnSpc>
+              <a:spcBef>
+                <a:spcPts val="600"/>
+              </a:spcBef>
+              <a:buFont typeface="Euphemia" pitchFamily="34" charset="0"/>
+              <a:buChar char="›"/>
+              <a:defRPr sz="1800" kern="1200" baseline="0">
+                <a:solidFill>
+                  <a:schemeClr val="lt1"/>
+                </a:solidFill>
+                <a:latin typeface="+mn-lt"/>
+                <a:ea typeface="+mn-ea"/>
+                <a:cs typeface="+mn-cs"/>
+              </a:defRPr>
+            </a:lvl9pPr>
+          </a:lstStyle>
+          <a:p>
+            <a:pPr marL="0" indent="0" algn="ctr">
+              <a:buNone/>
+            </a:pPr>
+            <a:r>
+              <a:rPr lang="en-US" sz="7200" b="1" dirty="0">
+                <a:solidFill>
+                  <a:schemeClr val="tx2">
+                    <a:lumMod val="75000"/>
+                    <a:lumOff val="25000"/>
+                  </a:schemeClr>
+                </a:solidFill>
+              </a:rPr>
+              <a:t>010</a:t>
+            </a:r>
+          </a:p>
+        </p:txBody>
+      </p:sp>
+      <p:sp>
+        <p:nvSpPr>
+          <p:cNvPr id="9" name="Title 12">
+            <a:extLst>
+              <a:ext uri="{FF2B5EF4-FFF2-40B4-BE49-F238E27FC236}">
+                <a16:creationId xmlns:a16="http://schemas.microsoft.com/office/drawing/2014/main" id="{7E8DE680-F178-94F4-6799-177F948D4631}"/>
+              </a:ext>
+            </a:extLst>
+          </p:cNvPr>
+          <p:cNvSpPr txBox="1">
+            <a:spLocks/>
+          </p:cNvSpPr>
+          <p:nvPr/>
+        </p:nvSpPr>
+        <p:spPr>
+          <a:xfrm>
+            <a:off x="1773932" y="1124744"/>
+            <a:ext cx="9782801" cy="843659"/>
+          </a:xfrm>
+          <a:prstGeom prst="rect">
+            <a:avLst/>
+          </a:prstGeom>
+        </p:spPr>
+        <p:txBody>
+          <a:bodyPr vert="horz" lIns="91440" tIns="45720" rIns="91440" bIns="45720" rtlCol="0" anchor="ctr">
+            <a:normAutofit fontScale="97500"/>
+          </a:bodyPr>
+          <a:lstStyle>
+            <a:lvl1pPr algn="l" defTabSz="914400" rtl="0" eaLnBrk="1" latinLnBrk="0" hangingPunct="1">
+              <a:lnSpc>
+                <a:spcPct val="90000"/>
+              </a:lnSpc>
+              <a:spcBef>
+                <a:spcPct val="0"/>
+              </a:spcBef>
+              <a:buNone/>
+              <a:defRPr sz="3600" kern="1200">
+                <a:solidFill>
+                  <a:schemeClr val="tx1">
+                    <a:lumMod val="75000"/>
+                  </a:schemeClr>
+                </a:solidFill>
+                <a:latin typeface="+mj-lt"/>
+                <a:ea typeface="+mj-ea"/>
+                <a:cs typeface="+mj-cs"/>
+              </a:defRPr>
+            </a:lvl1pPr>
+          </a:lstStyle>
+          <a:p>
+            <a:r>
+              <a:rPr lang="en-US" sz="4800" b="1" dirty="0"/>
+              <a:t>Example: Union</a:t>
+            </a:r>
+          </a:p>
+        </p:txBody>
+      </p:sp>
+      <p:pic>
+        <p:nvPicPr>
+          <p:cNvPr id="7" name="Picture 6">
+            <a:extLst>
+              <a:ext uri="{FF2B5EF4-FFF2-40B4-BE49-F238E27FC236}">
+                <a16:creationId xmlns:a16="http://schemas.microsoft.com/office/drawing/2014/main" id="{FE9AE061-0F77-12C8-2B2F-5855F2A5EA0B}"/>
+              </a:ext>
+            </a:extLst>
+          </p:cNvPr>
+          <p:cNvPicPr>
+            <a:picLocks noChangeAspect="1"/>
+          </p:cNvPicPr>
+          <p:nvPr/>
+        </p:nvPicPr>
+        <p:blipFill>
+          <a:blip r:embed="rId4"/>
+          <a:stretch>
+            <a:fillRect/>
+          </a:stretch>
+        </p:blipFill>
+        <p:spPr>
+          <a:xfrm>
+            <a:off x="2133972" y="1968403"/>
+            <a:ext cx="8157881" cy="4778813"/>
+          </a:xfrm>
+          <a:prstGeom prst="rect">
+            <a:avLst/>
+          </a:prstGeom>
+          <a:ln>
+            <a:noFill/>
+          </a:ln>
+          <a:effectLst>
+            <a:outerShdw blurRad="292100" dist="139700" dir="2700000" algn="tl" rotWithShape="0">
+              <a:srgbClr val="333333">
+                <a:alpha val="65000"/>
+              </a:srgbClr>
+            </a:outerShdw>
+          </a:effectLst>
+        </p:spPr>
+      </p:pic>
+    </p:spTree>
+    <p:extLst>
+      <p:ext uri="{BB962C8B-B14F-4D97-AF65-F5344CB8AC3E}">
+        <p14:creationId xmlns:p14="http://schemas.microsoft.com/office/powerpoint/2010/main" val="2981568777"/>
+      </p:ext>
+    </p:extLst>
+  </p:cSld>
+  <p:clrMapOvr>
+    <a:masterClrMapping/>
+  </p:clrMapOvr>
+  <mc:AlternateContent xmlns:mc="http://schemas.openxmlformats.org/markup-compatibility/2006">
+    <mc:Choice xmlns:p14="http://schemas.microsoft.com/office/powerpoint/2010/main" Requires="p14">
+      <p:transition spd="med" p14:dur="700">
+        <p:fade/>
+      </p:transition>
+    </mc:Choice>
+    <mc:Fallback>
+      <p:transition spd="med">
+        <p:fade/>
+      </p:transition>
+    </mc:Fallback>
+  </mc:AlternateContent>
+</p:sld>
+</file>
+
+<file path=ppt/slides/slide11.xml><?xml version="1.0" encoding="utf-8"?>
+<p:sld xmlns:a="http://schemas.openxmlformats.org/drawingml/2006/main" xmlns:r="http://schemas.openxmlformats.org/officeDocument/2006/relationships" xmlns:p="http://schemas.openxmlformats.org/presentationml/2006/main">
+  <p:cSld>
+    <p:spTree>
+      <p:nvGrpSpPr>
+        <p:cNvPr id="1" name="">
+          <a:extLst>
+            <a:ext uri="{FF2B5EF4-FFF2-40B4-BE49-F238E27FC236}">
+              <a16:creationId xmlns:a16="http://schemas.microsoft.com/office/drawing/2014/main" id="{4851099B-C6E0-FF03-3034-D29ADC2B5EC1}"/>
+            </a:ext>
+          </a:extLst>
+        </p:cNvPr>
+        <p:cNvGrpSpPr/>
+        <p:nvPr/>
+      </p:nvGrpSpPr>
+      <p:grpSpPr>
+        <a:xfrm>
+          <a:off x="0" y="0"/>
+          <a:ext cx="0" cy="0"/>
+          <a:chOff x="0" y="0"/>
+          <a:chExt cx="0" cy="0"/>
+        </a:xfrm>
+      </p:grpSpPr>
+      <p:sp>
+        <p:nvSpPr>
+          <p:cNvPr id="13" name="Title 12">
+            <a:extLst>
+              <a:ext uri="{FF2B5EF4-FFF2-40B4-BE49-F238E27FC236}">
+                <a16:creationId xmlns:a16="http://schemas.microsoft.com/office/drawing/2014/main" id="{922F7906-7CAF-6FE4-010B-9883A42690A7}"/>
+              </a:ext>
+            </a:extLst>
+          </p:cNvPr>
+          <p:cNvSpPr>
+            <a:spLocks noGrp="1"/>
+          </p:cNvSpPr>
+          <p:nvPr>
+            <p:ph type="title"/>
+          </p:nvPr>
+        </p:nvSpPr>
+        <p:spPr>
+          <a:xfrm>
+            <a:off x="1593436" y="260649"/>
+            <a:ext cx="6174521" cy="864096"/>
+          </a:xfrm>
+        </p:spPr>
+        <p:txBody>
+          <a:bodyPr anchor="ctr">
+            <a:normAutofit fontScale="90000"/>
+          </a:bodyPr>
+          <a:lstStyle/>
+          <a:p>
+            <a:r>
+              <a:rPr lang="en-US" sz="6000" b="1" dirty="0">
+                <a:latin typeface="ADLaM Display" panose="02010000000000000000" pitchFamily="2" charset="0"/>
+                <a:ea typeface="ADLaM Display" panose="02010000000000000000" pitchFamily="2" charset="0"/>
+                <a:cs typeface="ADLaM Display" panose="02010000000000000000" pitchFamily="2" charset="0"/>
+              </a:rPr>
+              <a:t>Learning Manim</a:t>
+            </a:r>
+          </a:p>
+        </p:txBody>
+      </p:sp>
+      <p:pic>
+        <p:nvPicPr>
+          <p:cNvPr id="4" name="Picture 3">
+            <a:extLst>
+              <a:ext uri="{FF2B5EF4-FFF2-40B4-BE49-F238E27FC236}">
+                <a16:creationId xmlns:a16="http://schemas.microsoft.com/office/drawing/2014/main" id="{94E304D6-769F-6172-B9D2-413E0284453C}"/>
+              </a:ext>
+            </a:extLst>
+          </p:cNvPr>
+          <p:cNvPicPr>
+            <a:picLocks noChangeAspect="1"/>
+          </p:cNvPicPr>
+          <p:nvPr/>
+        </p:nvPicPr>
+        <p:blipFill>
+          <a:blip r:embed="rId2"/>
+          <a:stretch>
+            <a:fillRect/>
+          </a:stretch>
+        </p:blipFill>
+        <p:spPr>
+          <a:xfrm>
+            <a:off x="7767957" y="83058"/>
+            <a:ext cx="4420868" cy="1512168"/>
+          </a:xfrm>
+          <a:prstGeom prst="rect">
+            <a:avLst/>
+          </a:prstGeom>
+        </p:spPr>
+      </p:pic>
+      <p:pic>
+        <p:nvPicPr>
+          <p:cNvPr id="5" name="Picture 4">
+            <a:extLst>
+              <a:ext uri="{FF2B5EF4-FFF2-40B4-BE49-F238E27FC236}">
+                <a16:creationId xmlns:a16="http://schemas.microsoft.com/office/drawing/2014/main" id="{E6A4E5CB-67BD-58E1-7409-AC8205C6E342}"/>
+              </a:ext>
+            </a:extLst>
+          </p:cNvPr>
+          <p:cNvPicPr>
+            <a:picLocks noChangeAspect="1"/>
+          </p:cNvPicPr>
+          <p:nvPr/>
+        </p:nvPicPr>
+        <p:blipFill>
+          <a:blip r:embed="rId3"/>
+          <a:stretch>
+            <a:fillRect/>
+          </a:stretch>
+        </p:blipFill>
+        <p:spPr>
+          <a:xfrm>
+            <a:off x="117748" y="5589240"/>
+            <a:ext cx="1152128" cy="1180931"/>
+          </a:xfrm>
+          <a:prstGeom prst="rect">
+            <a:avLst/>
+          </a:prstGeom>
+          <a:ln>
+            <a:noFill/>
+          </a:ln>
+          <a:effectLst>
+            <a:softEdge rad="112500"/>
+          </a:effectLst>
+        </p:spPr>
+      </p:pic>
+      <p:sp>
+        <p:nvSpPr>
+          <p:cNvPr id="6" name="Subtitle 2">
+            <a:extLst>
+              <a:ext uri="{FF2B5EF4-FFF2-40B4-BE49-F238E27FC236}">
+                <a16:creationId xmlns:a16="http://schemas.microsoft.com/office/drawing/2014/main" id="{54A8BE61-2C87-8B5A-3CA9-EC94114E0284}"/>
+              </a:ext>
+            </a:extLst>
+          </p:cNvPr>
+          <p:cNvSpPr txBox="1">
+            <a:spLocks/>
+          </p:cNvSpPr>
+          <p:nvPr/>
+        </p:nvSpPr>
+        <p:spPr>
+          <a:xfrm>
+            <a:off x="-1022" y="1484784"/>
+            <a:ext cx="1701923" cy="1368152"/>
+          </a:xfrm>
+          <a:prstGeom prst="rect">
+            <a:avLst/>
+          </a:prstGeom>
+        </p:spPr>
+        <p:style>
+          <a:lnRef idx="0">
+            <a:schemeClr val="accent2"/>
+          </a:lnRef>
+          <a:fillRef idx="3">
+            <a:schemeClr val="accent2"/>
+          </a:fillRef>
+          <a:effectRef idx="3">
+            <a:schemeClr val="accent2"/>
+          </a:effectRef>
+          <a:fontRef idx="minor">
+            <a:schemeClr val="lt1"/>
+          </a:fontRef>
+        </p:style>
+        <p:txBody>
+          <a:bodyPr vert="horz" lIns="91440" tIns="45720" rIns="91440" bIns="45720" rtlCol="0" anchor="ctr">
+            <a:normAutofit/>
+          </a:bodyPr>
+          <a:lstStyle>
+            <a:lvl1pPr marL="246888" indent="-246888" algn="l" defTabSz="914400" rtl="0" eaLnBrk="1" latinLnBrk="0" hangingPunct="1">
+              <a:lnSpc>
+                <a:spcPct val="90000"/>
+              </a:lnSpc>
+              <a:spcBef>
+                <a:spcPts val="1400"/>
+              </a:spcBef>
+              <a:buFont typeface="Euphemia" pitchFamily="34" charset="0"/>
+              <a:buChar char="›"/>
+              <a:defRPr sz="2800" kern="1200">
+                <a:solidFill>
+                  <a:schemeClr val="lt1"/>
+                </a:solidFill>
+                <a:latin typeface="+mn-lt"/>
+                <a:ea typeface="+mn-ea"/>
+                <a:cs typeface="+mn-cs"/>
+              </a:defRPr>
+            </a:lvl1pPr>
+            <a:lvl2pPr marL="612648" indent="-246888" algn="l" defTabSz="914400" rtl="0" eaLnBrk="1" latinLnBrk="0" hangingPunct="1">
+              <a:lnSpc>
+                <a:spcPct val="90000"/>
+              </a:lnSpc>
+              <a:spcBef>
+                <a:spcPts val="600"/>
+              </a:spcBef>
+              <a:buFont typeface="Euphemia" pitchFamily="34" charset="0"/>
+              <a:buChar char="–"/>
+              <a:defRPr sz="2400" kern="1200">
+                <a:solidFill>
+                  <a:schemeClr val="lt1"/>
+                </a:solidFill>
+                <a:latin typeface="+mn-lt"/>
+                <a:ea typeface="+mn-ea"/>
+                <a:cs typeface="+mn-cs"/>
+              </a:defRPr>
+            </a:lvl2pPr>
+            <a:lvl3pPr marL="978408" indent="-246888" algn="l" defTabSz="914400" rtl="0" eaLnBrk="1" latinLnBrk="0" hangingPunct="1">
+              <a:lnSpc>
+                <a:spcPct val="90000"/>
+              </a:lnSpc>
+              <a:spcBef>
+                <a:spcPts val="600"/>
+              </a:spcBef>
+              <a:buFont typeface="Euphemia" pitchFamily="34" charset="0"/>
+              <a:buChar char="›"/>
+              <a:defRPr sz="2000" kern="1200">
+                <a:solidFill>
+                  <a:schemeClr val="lt1"/>
+                </a:solidFill>
+                <a:latin typeface="+mn-lt"/>
+                <a:ea typeface="+mn-ea"/>
+                <a:cs typeface="+mn-cs"/>
+              </a:defRPr>
+            </a:lvl3pPr>
+            <a:lvl4pPr marL="1344168" indent="-246888" algn="l" defTabSz="914400" rtl="0" eaLnBrk="1" latinLnBrk="0" hangingPunct="1">
+              <a:lnSpc>
+                <a:spcPct val="90000"/>
+              </a:lnSpc>
+              <a:spcBef>
+                <a:spcPts val="600"/>
+              </a:spcBef>
+              <a:buFont typeface="Arial" pitchFamily="34" charset="0"/>
+              <a:buChar char="–"/>
+              <a:defRPr sz="1800" kern="1200">
+                <a:solidFill>
+                  <a:schemeClr val="lt1"/>
+                </a:solidFill>
+                <a:latin typeface="+mn-lt"/>
+                <a:ea typeface="+mn-ea"/>
+                <a:cs typeface="+mn-cs"/>
+              </a:defRPr>
+            </a:lvl4pPr>
+            <a:lvl5pPr marL="1709928" indent="-246888" algn="l" defTabSz="914400" rtl="0" eaLnBrk="1" latinLnBrk="0" hangingPunct="1">
+              <a:lnSpc>
+                <a:spcPct val="90000"/>
+              </a:lnSpc>
+              <a:spcBef>
+                <a:spcPts val="600"/>
+              </a:spcBef>
+              <a:buFont typeface="Euphemia" pitchFamily="34" charset="0"/>
+              <a:buChar char="›"/>
+              <a:defRPr sz="1800" kern="1200">
+                <a:solidFill>
+                  <a:schemeClr val="lt1"/>
+                </a:solidFill>
+                <a:latin typeface="+mn-lt"/>
+                <a:ea typeface="+mn-ea"/>
+                <a:cs typeface="+mn-cs"/>
+              </a:defRPr>
+            </a:lvl5pPr>
+            <a:lvl6pPr marL="2075688" indent="-246888" algn="l" defTabSz="914400" rtl="0" eaLnBrk="1" latinLnBrk="0" hangingPunct="1">
+              <a:lnSpc>
+                <a:spcPct val="90000"/>
+              </a:lnSpc>
+              <a:spcBef>
+                <a:spcPts val="600"/>
+              </a:spcBef>
+              <a:buFont typeface="Euphemia" pitchFamily="34" charset="0"/>
+              <a:buChar char="–"/>
+              <a:defRPr sz="1800" kern="1200">
+                <a:solidFill>
+                  <a:schemeClr val="lt1"/>
+                </a:solidFill>
+                <a:latin typeface="+mn-lt"/>
+                <a:ea typeface="+mn-ea"/>
+                <a:cs typeface="+mn-cs"/>
+              </a:defRPr>
+            </a:lvl6pPr>
+            <a:lvl7pPr marL="2441448" indent="-246888" algn="l" defTabSz="914400" rtl="0" eaLnBrk="1" latinLnBrk="0" hangingPunct="1">
+              <a:lnSpc>
+                <a:spcPct val="90000"/>
+              </a:lnSpc>
+              <a:spcBef>
+                <a:spcPts val="600"/>
+              </a:spcBef>
+              <a:buFont typeface="Euphemia" pitchFamily="34" charset="0"/>
+              <a:buChar char="›"/>
+              <a:defRPr sz="1800" kern="1200">
+                <a:solidFill>
+                  <a:schemeClr val="lt1"/>
+                </a:solidFill>
+                <a:latin typeface="+mn-lt"/>
+                <a:ea typeface="+mn-ea"/>
+                <a:cs typeface="+mn-cs"/>
+              </a:defRPr>
+            </a:lvl7pPr>
+            <a:lvl8pPr marL="2807208" indent="-246888" algn="l" defTabSz="914400" rtl="0" eaLnBrk="1" latinLnBrk="0" hangingPunct="1">
+              <a:lnSpc>
+                <a:spcPct val="90000"/>
+              </a:lnSpc>
+              <a:spcBef>
+                <a:spcPts val="600"/>
+              </a:spcBef>
+              <a:buFont typeface="Euphemia" pitchFamily="34" charset="0"/>
+              <a:buChar char="–"/>
+              <a:defRPr sz="1800" kern="1200" baseline="0">
+                <a:solidFill>
+                  <a:schemeClr val="lt1"/>
+                </a:solidFill>
+                <a:latin typeface="+mn-lt"/>
+                <a:ea typeface="+mn-ea"/>
+                <a:cs typeface="+mn-cs"/>
+              </a:defRPr>
+            </a:lvl8pPr>
+            <a:lvl9pPr marL="3172968" indent="-246888" algn="l" defTabSz="914400" rtl="0" eaLnBrk="1" latinLnBrk="0" hangingPunct="1">
+              <a:lnSpc>
+                <a:spcPct val="90000"/>
+              </a:lnSpc>
+              <a:spcBef>
+                <a:spcPts val="600"/>
+              </a:spcBef>
+              <a:buFont typeface="Euphemia" pitchFamily="34" charset="0"/>
+              <a:buChar char="›"/>
+              <a:defRPr sz="1800" kern="1200" baseline="0">
+                <a:solidFill>
+                  <a:schemeClr val="lt1"/>
+                </a:solidFill>
+                <a:latin typeface="+mn-lt"/>
+                <a:ea typeface="+mn-ea"/>
+                <a:cs typeface="+mn-cs"/>
+              </a:defRPr>
+            </a:lvl9pPr>
+          </a:lstStyle>
+          <a:p>
+            <a:pPr marL="0" indent="0" algn="ctr">
+              <a:buNone/>
+            </a:pPr>
+            <a:r>
+              <a:rPr lang="en-US" sz="7200" b="1" dirty="0">
+                <a:solidFill>
+                  <a:schemeClr val="tx2">
+                    <a:lumMod val="75000"/>
+                    <a:lumOff val="25000"/>
+                  </a:schemeClr>
+                </a:solidFill>
+              </a:rPr>
+              <a:t>011</a:t>
+            </a:r>
+          </a:p>
+        </p:txBody>
+      </p:sp>
+      <p:sp>
+        <p:nvSpPr>
+          <p:cNvPr id="9" name="Title 12">
+            <a:extLst>
+              <a:ext uri="{FF2B5EF4-FFF2-40B4-BE49-F238E27FC236}">
+                <a16:creationId xmlns:a16="http://schemas.microsoft.com/office/drawing/2014/main" id="{FD62B765-1697-4473-8325-9774F46DBAAC}"/>
+              </a:ext>
+            </a:extLst>
+          </p:cNvPr>
+          <p:cNvSpPr txBox="1">
+            <a:spLocks/>
+          </p:cNvSpPr>
+          <p:nvPr/>
+        </p:nvSpPr>
+        <p:spPr>
+          <a:xfrm>
+            <a:off x="1773932" y="1124744"/>
+            <a:ext cx="9782801" cy="843659"/>
+          </a:xfrm>
+          <a:prstGeom prst="rect">
+            <a:avLst/>
+          </a:prstGeom>
+        </p:spPr>
+        <p:txBody>
+          <a:bodyPr vert="horz" lIns="91440" tIns="45720" rIns="91440" bIns="45720" rtlCol="0" anchor="ctr">
+            <a:normAutofit fontScale="97500"/>
+          </a:bodyPr>
+          <a:lstStyle>
+            <a:lvl1pPr algn="l" defTabSz="914400" rtl="0" eaLnBrk="1" latinLnBrk="0" hangingPunct="1">
+              <a:lnSpc>
+                <a:spcPct val="90000"/>
+              </a:lnSpc>
+              <a:spcBef>
+                <a:spcPct val="0"/>
+              </a:spcBef>
+              <a:buNone/>
+              <a:defRPr sz="3600" kern="1200">
+                <a:solidFill>
+                  <a:schemeClr val="tx1">
+                    <a:lumMod val="75000"/>
+                  </a:schemeClr>
+                </a:solidFill>
+                <a:latin typeface="+mj-lt"/>
+                <a:ea typeface="+mj-ea"/>
+                <a:cs typeface="+mj-cs"/>
+              </a:defRPr>
+            </a:lvl1pPr>
+          </a:lstStyle>
+          <a:p>
+            <a:r>
+              <a:rPr lang="en-US" sz="4800" b="1" dirty="0"/>
+              <a:t>Example: Warp Square</a:t>
+            </a:r>
+          </a:p>
+        </p:txBody>
+      </p:sp>
+      <p:pic>
+        <p:nvPicPr>
+          <p:cNvPr id="3" name="Picture 2">
+            <a:extLst>
+              <a:ext uri="{FF2B5EF4-FFF2-40B4-BE49-F238E27FC236}">
+                <a16:creationId xmlns:a16="http://schemas.microsoft.com/office/drawing/2014/main" id="{B9F27D50-4329-6478-371D-EFE65342E54E}"/>
+              </a:ext>
+            </a:extLst>
+          </p:cNvPr>
+          <p:cNvPicPr>
+            <a:picLocks noChangeAspect="1"/>
+          </p:cNvPicPr>
+          <p:nvPr/>
+        </p:nvPicPr>
+        <p:blipFill>
+          <a:blip r:embed="rId4"/>
+          <a:stretch>
+            <a:fillRect/>
+          </a:stretch>
+        </p:blipFill>
+        <p:spPr>
+          <a:xfrm>
+            <a:off x="2139776" y="1959080"/>
+            <a:ext cx="8271830" cy="4811091"/>
+          </a:xfrm>
+          <a:prstGeom prst="rect">
+            <a:avLst/>
+          </a:prstGeom>
+          <a:ln>
+            <a:noFill/>
+          </a:ln>
+          <a:effectLst>
+            <a:outerShdw blurRad="292100" dist="139700" dir="2700000" algn="tl" rotWithShape="0">
+              <a:srgbClr val="333333">
+                <a:alpha val="65000"/>
+              </a:srgbClr>
+            </a:outerShdw>
+          </a:effectLst>
+        </p:spPr>
+      </p:pic>
+    </p:spTree>
+    <p:extLst>
+      <p:ext uri="{BB962C8B-B14F-4D97-AF65-F5344CB8AC3E}">
+        <p14:creationId xmlns:p14="http://schemas.microsoft.com/office/powerpoint/2010/main" val="2095895203"/>
+      </p:ext>
+    </p:extLst>
+  </p:cSld>
+  <p:clrMapOvr>
+    <a:masterClrMapping/>
+  </p:clrMapOvr>
+  <mc:AlternateContent xmlns:mc="http://schemas.openxmlformats.org/markup-compatibility/2006">
+    <mc:Choice xmlns:p14="http://schemas.microsoft.com/office/powerpoint/2010/main" Requires="p14">
+      <p:transition spd="med" p14:dur="700">
+        <p:fade/>
+      </p:transition>
+    </mc:Choice>
+    <mc:Fallback>
+      <p:transition spd="med">
+        <p:fade/>
+      </p:transition>
+    </mc:Fallback>
+  </mc:AlternateContent>
+</p:sld>
+</file>
+
+<file path=ppt/slides/slide12.xml><?xml version="1.0" encoding="utf-8"?>
+<p:sld xmlns:a="http://schemas.openxmlformats.org/drawingml/2006/main" xmlns:r="http://schemas.openxmlformats.org/officeDocument/2006/relationships" xmlns:p="http://schemas.openxmlformats.org/presentationml/2006/main">
+  <p:cSld>
+    <p:spTree>
+      <p:nvGrpSpPr>
+        <p:cNvPr id="1" name="">
+          <a:extLst>
+            <a:ext uri="{FF2B5EF4-FFF2-40B4-BE49-F238E27FC236}">
+              <a16:creationId xmlns:a16="http://schemas.microsoft.com/office/drawing/2014/main" id="{CBE949B7-D948-8F99-6706-5EA7362D403D}"/>
+            </a:ext>
+          </a:extLst>
+        </p:cNvPr>
+        <p:cNvGrpSpPr/>
+        <p:nvPr/>
+      </p:nvGrpSpPr>
+      <p:grpSpPr>
+        <a:xfrm>
+          <a:off x="0" y="0"/>
+          <a:ext cx="0" cy="0"/>
+          <a:chOff x="0" y="0"/>
+          <a:chExt cx="0" cy="0"/>
+        </a:xfrm>
+      </p:grpSpPr>
+      <p:pic>
+        <p:nvPicPr>
+          <p:cNvPr id="5" name="Picture 4">
+            <a:extLst>
+              <a:ext uri="{FF2B5EF4-FFF2-40B4-BE49-F238E27FC236}">
+                <a16:creationId xmlns:a16="http://schemas.microsoft.com/office/drawing/2014/main" id="{468AEE3A-B5E7-961E-C258-1069B06DCAFE}"/>
+              </a:ext>
+            </a:extLst>
+          </p:cNvPr>
+          <p:cNvPicPr>
+            <a:picLocks noChangeAspect="1"/>
+          </p:cNvPicPr>
+          <p:nvPr/>
+        </p:nvPicPr>
+        <p:blipFill>
+          <a:blip r:embed="rId2"/>
+          <a:stretch>
+            <a:fillRect/>
+          </a:stretch>
+        </p:blipFill>
+        <p:spPr>
+          <a:xfrm>
+            <a:off x="1197868" y="2132856"/>
+            <a:ext cx="10265766" cy="3511429"/>
+          </a:xfrm>
+          <a:prstGeom prst="rect">
+            <a:avLst/>
+          </a:prstGeom>
+        </p:spPr>
+      </p:pic>
+      <p:pic>
+        <p:nvPicPr>
+          <p:cNvPr id="7" name="Picture 6">
+            <a:extLst>
+              <a:ext uri="{FF2B5EF4-FFF2-40B4-BE49-F238E27FC236}">
+                <a16:creationId xmlns:a16="http://schemas.microsoft.com/office/drawing/2014/main" id="{B910BE0A-266E-4CCD-979F-DAB960AE87D4}"/>
+              </a:ext>
+            </a:extLst>
+          </p:cNvPr>
+          <p:cNvPicPr>
+            <a:picLocks noChangeAspect="1"/>
+          </p:cNvPicPr>
+          <p:nvPr/>
+        </p:nvPicPr>
+        <p:blipFill>
+          <a:blip r:embed="rId3"/>
+          <a:stretch>
+            <a:fillRect/>
+          </a:stretch>
+        </p:blipFill>
+        <p:spPr>
+          <a:xfrm>
+            <a:off x="1413892" y="4542455"/>
+            <a:ext cx="2232248" cy="2288054"/>
+          </a:xfrm>
+          <a:prstGeom prst="rect">
+            <a:avLst/>
+          </a:prstGeom>
+          <a:ln>
+            <a:noFill/>
+          </a:ln>
+          <a:effectLst>
+            <a:softEdge rad="112500"/>
+          </a:effectLst>
+        </p:spPr>
+      </p:pic>
+      <p:pic>
+        <p:nvPicPr>
+          <p:cNvPr id="12" name="Picture 11">
+            <a:extLst>
+              <a:ext uri="{FF2B5EF4-FFF2-40B4-BE49-F238E27FC236}">
+                <a16:creationId xmlns:a16="http://schemas.microsoft.com/office/drawing/2014/main" id="{5C0E66FD-51BF-60D4-481D-048D92927193}"/>
+              </a:ext>
+            </a:extLst>
+          </p:cNvPr>
+          <p:cNvPicPr>
+            <a:picLocks noChangeAspect="1"/>
+          </p:cNvPicPr>
+          <p:nvPr/>
+        </p:nvPicPr>
+        <p:blipFill>
+          <a:blip r:embed="rId4"/>
+          <a:stretch>
+            <a:fillRect/>
+          </a:stretch>
+        </p:blipFill>
+        <p:spPr>
+          <a:xfrm>
+            <a:off x="1917948" y="447785"/>
+            <a:ext cx="2520280" cy="1685071"/>
+          </a:xfrm>
+          <a:prstGeom prst="rect">
+            <a:avLst/>
+          </a:prstGeom>
+          <a:ln>
+            <a:noFill/>
+          </a:ln>
+          <a:effectLst>
+            <a:outerShdw blurRad="292100" dist="139700" dir="2700000" algn="tl" rotWithShape="0">
+              <a:srgbClr val="333333">
+                <a:alpha val="65000"/>
+              </a:srgbClr>
+            </a:outerShdw>
+          </a:effectLst>
+        </p:spPr>
+      </p:pic>
+      <p:pic>
+        <p:nvPicPr>
+          <p:cNvPr id="14" name="Picture 13">
+            <a:extLst>
+              <a:ext uri="{FF2B5EF4-FFF2-40B4-BE49-F238E27FC236}">
+                <a16:creationId xmlns:a16="http://schemas.microsoft.com/office/drawing/2014/main" id="{316CFA05-4F6F-798E-E9E1-3C50BB2D3562}"/>
+              </a:ext>
+            </a:extLst>
+          </p:cNvPr>
+          <p:cNvPicPr>
+            <a:picLocks noChangeAspect="1"/>
+          </p:cNvPicPr>
+          <p:nvPr/>
+        </p:nvPicPr>
+        <p:blipFill>
+          <a:blip r:embed="rId5"/>
+          <a:stretch>
+            <a:fillRect/>
+          </a:stretch>
+        </p:blipFill>
+        <p:spPr>
+          <a:xfrm>
+            <a:off x="4841589" y="447784"/>
+            <a:ext cx="2433638" cy="1685071"/>
+          </a:xfrm>
+          <a:prstGeom prst="rect">
+            <a:avLst/>
+          </a:prstGeom>
+          <a:ln>
+            <a:noFill/>
+          </a:ln>
+          <a:effectLst>
+            <a:outerShdw blurRad="292100" dist="139700" dir="2700000" algn="tl" rotWithShape="0">
+              <a:srgbClr val="333333">
+                <a:alpha val="65000"/>
+              </a:srgbClr>
+            </a:outerShdw>
+          </a:effectLst>
+        </p:spPr>
+      </p:pic>
+      <p:pic>
+        <p:nvPicPr>
+          <p:cNvPr id="16" name="Picture 15">
+            <a:extLst>
+              <a:ext uri="{FF2B5EF4-FFF2-40B4-BE49-F238E27FC236}">
+                <a16:creationId xmlns:a16="http://schemas.microsoft.com/office/drawing/2014/main" id="{377E0420-B2C1-35F7-D502-259FAD94F5B1}"/>
+              </a:ext>
+            </a:extLst>
+          </p:cNvPr>
+          <p:cNvPicPr>
+            <a:picLocks noChangeAspect="1"/>
+          </p:cNvPicPr>
+          <p:nvPr/>
+        </p:nvPicPr>
+        <p:blipFill>
+          <a:blip r:embed="rId6"/>
+          <a:stretch>
+            <a:fillRect/>
+          </a:stretch>
+        </p:blipFill>
+        <p:spPr>
+          <a:xfrm>
+            <a:off x="7678588" y="447785"/>
+            <a:ext cx="2433638" cy="1685071"/>
+          </a:xfrm>
+          <a:prstGeom prst="rect">
+            <a:avLst/>
+          </a:prstGeom>
+          <a:ln>
+            <a:noFill/>
+          </a:ln>
+          <a:effectLst>
+            <a:outerShdw blurRad="292100" dist="139700" dir="2700000" algn="tl" rotWithShape="0">
+              <a:srgbClr val="333333">
+                <a:alpha val="65000"/>
+              </a:srgbClr>
+            </a:outerShdw>
+          </a:effectLst>
+        </p:spPr>
+      </p:pic>
+    </p:spTree>
+    <p:extLst>
+      <p:ext uri="{BB962C8B-B14F-4D97-AF65-F5344CB8AC3E}">
+        <p14:creationId xmlns:p14="http://schemas.microsoft.com/office/powerpoint/2010/main" val="2151474947"/>
+      </p:ext>
+    </p:extLst>
+  </p:cSld>
+  <p:clrMapOvr>
+    <a:masterClrMapping/>
+  </p:clrMapOvr>
+  <mc:AlternateContent xmlns:mc="http://schemas.openxmlformats.org/markup-compatibility/2006" xmlns:p14="http://schemas.microsoft.com/office/powerpoint/2010/main">
+    <mc:Choice Requires="p14">
+      <p:transition spd="med" p14:dur="700">
+        <p:fade/>
+      </p:transition>
+    </mc:Choice>
+    <mc:Fallback xmlns="">
+      <p:transition spd="med">
+        <p:fade/>
+      </p:transition>
+    </mc:Fallback>
+  </mc:AlternateContent>
+</p:sld>
+</file>
+
 <file path=ppt/slides/slide2.xml><?xml version="1.0" encoding="utf-8"?>
 <p:sld xmlns:a="http://schemas.openxmlformats.org/drawingml/2006/main" xmlns:r="http://schemas.openxmlformats.org/officeDocument/2006/relationships" xmlns:p="http://schemas.openxmlformats.org/presentationml/2006/main">
   <p:cSld>
@@ -9578,10 +10787,1938 @@
           </a:p>
         </p:txBody>
       </p:sp>
+      <p:pic>
+        <p:nvPicPr>
+          <p:cNvPr id="3" name="Picture 2">
+            <a:extLst>
+              <a:ext uri="{FF2B5EF4-FFF2-40B4-BE49-F238E27FC236}">
+                <a16:creationId xmlns:a16="http://schemas.microsoft.com/office/drawing/2014/main" id="{44FA732C-E1EB-4402-A35D-16D54C941CC1}"/>
+              </a:ext>
+            </a:extLst>
+          </p:cNvPr>
+          <p:cNvPicPr>
+            <a:picLocks noChangeAspect="1"/>
+          </p:cNvPicPr>
+          <p:nvPr/>
+        </p:nvPicPr>
+        <p:blipFill>
+          <a:blip r:embed="rId4"/>
+          <a:stretch>
+            <a:fillRect/>
+          </a:stretch>
+        </p:blipFill>
+        <p:spPr>
+          <a:xfrm>
+            <a:off x="2277988" y="2351580"/>
+            <a:ext cx="7444361" cy="4355957"/>
+          </a:xfrm>
+          <a:prstGeom prst="rect">
+            <a:avLst/>
+          </a:prstGeom>
+          <a:ln>
+            <a:noFill/>
+          </a:ln>
+          <a:effectLst>
+            <a:outerShdw blurRad="292100" dist="139700" dir="2700000" algn="tl" rotWithShape="0">
+              <a:srgbClr val="333333">
+                <a:alpha val="65000"/>
+              </a:srgbClr>
+            </a:outerShdw>
+          </a:effectLst>
+        </p:spPr>
+      </p:pic>
     </p:spTree>
     <p:extLst>
       <p:ext uri="{BB962C8B-B14F-4D97-AF65-F5344CB8AC3E}">
         <p14:creationId xmlns:p14="http://schemas.microsoft.com/office/powerpoint/2010/main" val="2554437319"/>
+      </p:ext>
+    </p:extLst>
+  </p:cSld>
+  <p:clrMapOvr>
+    <a:masterClrMapping/>
+  </p:clrMapOvr>
+  <mc:AlternateContent xmlns:mc="http://schemas.openxmlformats.org/markup-compatibility/2006">
+    <mc:Choice xmlns:p14="http://schemas.microsoft.com/office/powerpoint/2010/main" Requires="p14">
+      <p:transition spd="med" p14:dur="700">
+        <p:fade/>
+      </p:transition>
+    </mc:Choice>
+    <mc:Fallback>
+      <p:transition spd="med">
+        <p:fade/>
+      </p:transition>
+    </mc:Fallback>
+  </mc:AlternateContent>
+</p:sld>
+</file>
+
+<file path=ppt/slides/slide6.xml><?xml version="1.0" encoding="utf-8"?>
+<p:sld xmlns:a="http://schemas.openxmlformats.org/drawingml/2006/main" xmlns:r="http://schemas.openxmlformats.org/officeDocument/2006/relationships" xmlns:p="http://schemas.openxmlformats.org/presentationml/2006/main">
+  <p:cSld>
+    <p:spTree>
+      <p:nvGrpSpPr>
+        <p:cNvPr id="1" name="">
+          <a:extLst>
+            <a:ext uri="{FF2B5EF4-FFF2-40B4-BE49-F238E27FC236}">
+              <a16:creationId xmlns:a16="http://schemas.microsoft.com/office/drawing/2014/main" id="{34B2909B-3967-EA47-2E65-363CF5C70E6D}"/>
+            </a:ext>
+          </a:extLst>
+        </p:cNvPr>
+        <p:cNvGrpSpPr/>
+        <p:nvPr/>
+      </p:nvGrpSpPr>
+      <p:grpSpPr>
+        <a:xfrm>
+          <a:off x="0" y="0"/>
+          <a:ext cx="0" cy="0"/>
+          <a:chOff x="0" y="0"/>
+          <a:chExt cx="0" cy="0"/>
+        </a:xfrm>
+      </p:grpSpPr>
+      <p:sp>
+        <p:nvSpPr>
+          <p:cNvPr id="13" name="Title 12">
+            <a:extLst>
+              <a:ext uri="{FF2B5EF4-FFF2-40B4-BE49-F238E27FC236}">
+                <a16:creationId xmlns:a16="http://schemas.microsoft.com/office/drawing/2014/main" id="{796405A4-77DA-0AD6-FE42-544B681643BC}"/>
+              </a:ext>
+            </a:extLst>
+          </p:cNvPr>
+          <p:cNvSpPr>
+            <a:spLocks noGrp="1"/>
+          </p:cNvSpPr>
+          <p:nvPr>
+            <p:ph type="title"/>
+          </p:nvPr>
+        </p:nvSpPr>
+        <p:spPr>
+          <a:xfrm>
+            <a:off x="1593436" y="260649"/>
+            <a:ext cx="6174521" cy="864096"/>
+          </a:xfrm>
+        </p:spPr>
+        <p:txBody>
+          <a:bodyPr anchor="ctr">
+            <a:normAutofit fontScale="90000"/>
+          </a:bodyPr>
+          <a:lstStyle/>
+          <a:p>
+            <a:r>
+              <a:rPr lang="en-US" sz="6000" b="1" dirty="0">
+                <a:latin typeface="ADLaM Display" panose="02010000000000000000" pitchFamily="2" charset="0"/>
+                <a:ea typeface="ADLaM Display" panose="02010000000000000000" pitchFamily="2" charset="0"/>
+                <a:cs typeface="ADLaM Display" panose="02010000000000000000" pitchFamily="2" charset="0"/>
+              </a:rPr>
+              <a:t>Learning Manim</a:t>
+            </a:r>
+          </a:p>
+        </p:txBody>
+      </p:sp>
+      <p:pic>
+        <p:nvPicPr>
+          <p:cNvPr id="4" name="Picture 3">
+            <a:extLst>
+              <a:ext uri="{FF2B5EF4-FFF2-40B4-BE49-F238E27FC236}">
+                <a16:creationId xmlns:a16="http://schemas.microsoft.com/office/drawing/2014/main" id="{76C6B7C9-52D4-3849-3DC7-579E8C7A57F6}"/>
+              </a:ext>
+            </a:extLst>
+          </p:cNvPr>
+          <p:cNvPicPr>
+            <a:picLocks noChangeAspect="1"/>
+          </p:cNvPicPr>
+          <p:nvPr/>
+        </p:nvPicPr>
+        <p:blipFill>
+          <a:blip r:embed="rId2"/>
+          <a:stretch>
+            <a:fillRect/>
+          </a:stretch>
+        </p:blipFill>
+        <p:spPr>
+          <a:xfrm>
+            <a:off x="7767957" y="83058"/>
+            <a:ext cx="4420868" cy="1512168"/>
+          </a:xfrm>
+          <a:prstGeom prst="rect">
+            <a:avLst/>
+          </a:prstGeom>
+        </p:spPr>
+      </p:pic>
+      <p:pic>
+        <p:nvPicPr>
+          <p:cNvPr id="5" name="Picture 4">
+            <a:extLst>
+              <a:ext uri="{FF2B5EF4-FFF2-40B4-BE49-F238E27FC236}">
+                <a16:creationId xmlns:a16="http://schemas.microsoft.com/office/drawing/2014/main" id="{62E0907A-660E-16E3-0512-B4BDC102A343}"/>
+              </a:ext>
+            </a:extLst>
+          </p:cNvPr>
+          <p:cNvPicPr>
+            <a:picLocks noChangeAspect="1"/>
+          </p:cNvPicPr>
+          <p:nvPr/>
+        </p:nvPicPr>
+        <p:blipFill>
+          <a:blip r:embed="rId3"/>
+          <a:stretch>
+            <a:fillRect/>
+          </a:stretch>
+        </p:blipFill>
+        <p:spPr>
+          <a:xfrm>
+            <a:off x="117748" y="5589240"/>
+            <a:ext cx="1152128" cy="1180931"/>
+          </a:xfrm>
+          <a:prstGeom prst="rect">
+            <a:avLst/>
+          </a:prstGeom>
+          <a:ln>
+            <a:noFill/>
+          </a:ln>
+          <a:effectLst>
+            <a:softEdge rad="112500"/>
+          </a:effectLst>
+        </p:spPr>
+      </p:pic>
+      <p:sp>
+        <p:nvSpPr>
+          <p:cNvPr id="6" name="Subtitle 2">
+            <a:extLst>
+              <a:ext uri="{FF2B5EF4-FFF2-40B4-BE49-F238E27FC236}">
+                <a16:creationId xmlns:a16="http://schemas.microsoft.com/office/drawing/2014/main" id="{8025BF3D-663F-643D-F94E-18C643FCFA67}"/>
+              </a:ext>
+            </a:extLst>
+          </p:cNvPr>
+          <p:cNvSpPr txBox="1">
+            <a:spLocks/>
+          </p:cNvSpPr>
+          <p:nvPr/>
+        </p:nvSpPr>
+        <p:spPr>
+          <a:xfrm>
+            <a:off x="-1022" y="1484784"/>
+            <a:ext cx="1701923" cy="1368152"/>
+          </a:xfrm>
+          <a:prstGeom prst="rect">
+            <a:avLst/>
+          </a:prstGeom>
+        </p:spPr>
+        <p:style>
+          <a:lnRef idx="0">
+            <a:schemeClr val="accent2"/>
+          </a:lnRef>
+          <a:fillRef idx="3">
+            <a:schemeClr val="accent2"/>
+          </a:fillRef>
+          <a:effectRef idx="3">
+            <a:schemeClr val="accent2"/>
+          </a:effectRef>
+          <a:fontRef idx="minor">
+            <a:schemeClr val="lt1"/>
+          </a:fontRef>
+        </p:style>
+        <p:txBody>
+          <a:bodyPr vert="horz" lIns="91440" tIns="45720" rIns="91440" bIns="45720" rtlCol="0" anchor="ctr">
+            <a:normAutofit fontScale="92500"/>
+          </a:bodyPr>
+          <a:lstStyle>
+            <a:lvl1pPr marL="246888" indent="-246888" algn="l" defTabSz="914400" rtl="0" eaLnBrk="1" latinLnBrk="0" hangingPunct="1">
+              <a:lnSpc>
+                <a:spcPct val="90000"/>
+              </a:lnSpc>
+              <a:spcBef>
+                <a:spcPts val="1400"/>
+              </a:spcBef>
+              <a:buFont typeface="Euphemia" pitchFamily="34" charset="0"/>
+              <a:buChar char="›"/>
+              <a:defRPr sz="2800" kern="1200">
+                <a:solidFill>
+                  <a:schemeClr val="lt1"/>
+                </a:solidFill>
+                <a:latin typeface="+mn-lt"/>
+                <a:ea typeface="+mn-ea"/>
+                <a:cs typeface="+mn-cs"/>
+              </a:defRPr>
+            </a:lvl1pPr>
+            <a:lvl2pPr marL="612648" indent="-246888" algn="l" defTabSz="914400" rtl="0" eaLnBrk="1" latinLnBrk="0" hangingPunct="1">
+              <a:lnSpc>
+                <a:spcPct val="90000"/>
+              </a:lnSpc>
+              <a:spcBef>
+                <a:spcPts val="600"/>
+              </a:spcBef>
+              <a:buFont typeface="Euphemia" pitchFamily="34" charset="0"/>
+              <a:buChar char="–"/>
+              <a:defRPr sz="2400" kern="1200">
+                <a:solidFill>
+                  <a:schemeClr val="lt1"/>
+                </a:solidFill>
+                <a:latin typeface="+mn-lt"/>
+                <a:ea typeface="+mn-ea"/>
+                <a:cs typeface="+mn-cs"/>
+              </a:defRPr>
+            </a:lvl2pPr>
+            <a:lvl3pPr marL="978408" indent="-246888" algn="l" defTabSz="914400" rtl="0" eaLnBrk="1" latinLnBrk="0" hangingPunct="1">
+              <a:lnSpc>
+                <a:spcPct val="90000"/>
+              </a:lnSpc>
+              <a:spcBef>
+                <a:spcPts val="600"/>
+              </a:spcBef>
+              <a:buFont typeface="Euphemia" pitchFamily="34" charset="0"/>
+              <a:buChar char="›"/>
+              <a:defRPr sz="2000" kern="1200">
+                <a:solidFill>
+                  <a:schemeClr val="lt1"/>
+                </a:solidFill>
+                <a:latin typeface="+mn-lt"/>
+                <a:ea typeface="+mn-ea"/>
+                <a:cs typeface="+mn-cs"/>
+              </a:defRPr>
+            </a:lvl3pPr>
+            <a:lvl4pPr marL="1344168" indent="-246888" algn="l" defTabSz="914400" rtl="0" eaLnBrk="1" latinLnBrk="0" hangingPunct="1">
+              <a:lnSpc>
+                <a:spcPct val="90000"/>
+              </a:lnSpc>
+              <a:spcBef>
+                <a:spcPts val="600"/>
+              </a:spcBef>
+              <a:buFont typeface="Arial" pitchFamily="34" charset="0"/>
+              <a:buChar char="–"/>
+              <a:defRPr sz="1800" kern="1200">
+                <a:solidFill>
+                  <a:schemeClr val="lt1"/>
+                </a:solidFill>
+                <a:latin typeface="+mn-lt"/>
+                <a:ea typeface="+mn-ea"/>
+                <a:cs typeface="+mn-cs"/>
+              </a:defRPr>
+            </a:lvl4pPr>
+            <a:lvl5pPr marL="1709928" indent="-246888" algn="l" defTabSz="914400" rtl="0" eaLnBrk="1" latinLnBrk="0" hangingPunct="1">
+              <a:lnSpc>
+                <a:spcPct val="90000"/>
+              </a:lnSpc>
+              <a:spcBef>
+                <a:spcPts val="600"/>
+              </a:spcBef>
+              <a:buFont typeface="Euphemia" pitchFamily="34" charset="0"/>
+              <a:buChar char="›"/>
+              <a:defRPr sz="1800" kern="1200">
+                <a:solidFill>
+                  <a:schemeClr val="lt1"/>
+                </a:solidFill>
+                <a:latin typeface="+mn-lt"/>
+                <a:ea typeface="+mn-ea"/>
+                <a:cs typeface="+mn-cs"/>
+              </a:defRPr>
+            </a:lvl5pPr>
+            <a:lvl6pPr marL="2075688" indent="-246888" algn="l" defTabSz="914400" rtl="0" eaLnBrk="1" latinLnBrk="0" hangingPunct="1">
+              <a:lnSpc>
+                <a:spcPct val="90000"/>
+              </a:lnSpc>
+              <a:spcBef>
+                <a:spcPts val="600"/>
+              </a:spcBef>
+              <a:buFont typeface="Euphemia" pitchFamily="34" charset="0"/>
+              <a:buChar char="–"/>
+              <a:defRPr sz="1800" kern="1200">
+                <a:solidFill>
+                  <a:schemeClr val="lt1"/>
+                </a:solidFill>
+                <a:latin typeface="+mn-lt"/>
+                <a:ea typeface="+mn-ea"/>
+                <a:cs typeface="+mn-cs"/>
+              </a:defRPr>
+            </a:lvl6pPr>
+            <a:lvl7pPr marL="2441448" indent="-246888" algn="l" defTabSz="914400" rtl="0" eaLnBrk="1" latinLnBrk="0" hangingPunct="1">
+              <a:lnSpc>
+                <a:spcPct val="90000"/>
+              </a:lnSpc>
+              <a:spcBef>
+                <a:spcPts val="600"/>
+              </a:spcBef>
+              <a:buFont typeface="Euphemia" pitchFamily="34" charset="0"/>
+              <a:buChar char="›"/>
+              <a:defRPr sz="1800" kern="1200">
+                <a:solidFill>
+                  <a:schemeClr val="lt1"/>
+                </a:solidFill>
+                <a:latin typeface="+mn-lt"/>
+                <a:ea typeface="+mn-ea"/>
+                <a:cs typeface="+mn-cs"/>
+              </a:defRPr>
+            </a:lvl7pPr>
+            <a:lvl8pPr marL="2807208" indent="-246888" algn="l" defTabSz="914400" rtl="0" eaLnBrk="1" latinLnBrk="0" hangingPunct="1">
+              <a:lnSpc>
+                <a:spcPct val="90000"/>
+              </a:lnSpc>
+              <a:spcBef>
+                <a:spcPts val="600"/>
+              </a:spcBef>
+              <a:buFont typeface="Euphemia" pitchFamily="34" charset="0"/>
+              <a:buChar char="–"/>
+              <a:defRPr sz="1800" kern="1200" baseline="0">
+                <a:solidFill>
+                  <a:schemeClr val="lt1"/>
+                </a:solidFill>
+                <a:latin typeface="+mn-lt"/>
+                <a:ea typeface="+mn-ea"/>
+                <a:cs typeface="+mn-cs"/>
+              </a:defRPr>
+            </a:lvl8pPr>
+            <a:lvl9pPr marL="3172968" indent="-246888" algn="l" defTabSz="914400" rtl="0" eaLnBrk="1" latinLnBrk="0" hangingPunct="1">
+              <a:lnSpc>
+                <a:spcPct val="90000"/>
+              </a:lnSpc>
+              <a:spcBef>
+                <a:spcPts val="600"/>
+              </a:spcBef>
+              <a:buFont typeface="Euphemia" pitchFamily="34" charset="0"/>
+              <a:buChar char="›"/>
+              <a:defRPr sz="1800" kern="1200" baseline="0">
+                <a:solidFill>
+                  <a:schemeClr val="lt1"/>
+                </a:solidFill>
+                <a:latin typeface="+mn-lt"/>
+                <a:ea typeface="+mn-ea"/>
+                <a:cs typeface="+mn-cs"/>
+              </a:defRPr>
+            </a:lvl9pPr>
+          </a:lstStyle>
+          <a:p>
+            <a:pPr marL="0" indent="0" algn="ctr">
+              <a:buNone/>
+            </a:pPr>
+            <a:r>
+              <a:rPr lang="en-US" sz="7200" b="1" dirty="0">
+                <a:solidFill>
+                  <a:schemeClr val="tx2">
+                    <a:lumMod val="75000"/>
+                    <a:lumOff val="25000"/>
+                  </a:schemeClr>
+                </a:solidFill>
+              </a:rPr>
+              <a:t>006</a:t>
+            </a:r>
+          </a:p>
+        </p:txBody>
+      </p:sp>
+      <p:sp>
+        <p:nvSpPr>
+          <p:cNvPr id="9" name="Title 12">
+            <a:extLst>
+              <a:ext uri="{FF2B5EF4-FFF2-40B4-BE49-F238E27FC236}">
+                <a16:creationId xmlns:a16="http://schemas.microsoft.com/office/drawing/2014/main" id="{4F99A4BE-0B6A-3876-36F6-C1E599592DDA}"/>
+              </a:ext>
+            </a:extLst>
+          </p:cNvPr>
+          <p:cNvSpPr txBox="1">
+            <a:spLocks/>
+          </p:cNvSpPr>
+          <p:nvPr/>
+        </p:nvSpPr>
+        <p:spPr>
+          <a:xfrm>
+            <a:off x="1773932" y="1484783"/>
+            <a:ext cx="9782801" cy="843659"/>
+          </a:xfrm>
+          <a:prstGeom prst="rect">
+            <a:avLst/>
+          </a:prstGeom>
+        </p:spPr>
+        <p:txBody>
+          <a:bodyPr vert="horz" lIns="91440" tIns="45720" rIns="91440" bIns="45720" rtlCol="0" anchor="ctr">
+            <a:normAutofit fontScale="90000"/>
+          </a:bodyPr>
+          <a:lstStyle>
+            <a:lvl1pPr algn="l" defTabSz="914400" rtl="0" eaLnBrk="1" latinLnBrk="0" hangingPunct="1">
+              <a:lnSpc>
+                <a:spcPct val="90000"/>
+              </a:lnSpc>
+              <a:spcBef>
+                <a:spcPct val="0"/>
+              </a:spcBef>
+              <a:buNone/>
+              <a:defRPr sz="3600" kern="1200">
+                <a:solidFill>
+                  <a:schemeClr val="tx1">
+                    <a:lumMod val="75000"/>
+                  </a:schemeClr>
+                </a:solidFill>
+                <a:latin typeface="+mj-lt"/>
+                <a:ea typeface="+mj-ea"/>
+                <a:cs typeface="+mj-cs"/>
+              </a:defRPr>
+            </a:lvl1pPr>
+          </a:lstStyle>
+          <a:p>
+            <a:r>
+              <a:rPr lang="en-US" sz="4800" b="1" dirty="0"/>
+              <a:t>Transform vs. ReplacementTransform</a:t>
+            </a:r>
+          </a:p>
+        </p:txBody>
+      </p:sp>
+      <p:pic>
+        <p:nvPicPr>
+          <p:cNvPr id="7" name="Picture 6">
+            <a:extLst>
+              <a:ext uri="{FF2B5EF4-FFF2-40B4-BE49-F238E27FC236}">
+                <a16:creationId xmlns:a16="http://schemas.microsoft.com/office/drawing/2014/main" id="{D29764C9-882A-984A-8145-1D79E399DA19}"/>
+              </a:ext>
+            </a:extLst>
+          </p:cNvPr>
+          <p:cNvPicPr>
+            <a:picLocks noChangeAspect="1"/>
+          </p:cNvPicPr>
+          <p:nvPr/>
+        </p:nvPicPr>
+        <p:blipFill>
+          <a:blip r:embed="rId4"/>
+          <a:stretch>
+            <a:fillRect/>
+          </a:stretch>
+        </p:blipFill>
+        <p:spPr>
+          <a:xfrm>
+            <a:off x="2494012" y="2295142"/>
+            <a:ext cx="7612545" cy="4468833"/>
+          </a:xfrm>
+          <a:prstGeom prst="rect">
+            <a:avLst/>
+          </a:prstGeom>
+          <a:ln>
+            <a:noFill/>
+          </a:ln>
+          <a:effectLst>
+            <a:outerShdw blurRad="292100" dist="139700" dir="2700000" algn="tl" rotWithShape="0">
+              <a:srgbClr val="333333">
+                <a:alpha val="65000"/>
+              </a:srgbClr>
+            </a:outerShdw>
+          </a:effectLst>
+        </p:spPr>
+      </p:pic>
+    </p:spTree>
+    <p:extLst>
+      <p:ext uri="{BB962C8B-B14F-4D97-AF65-F5344CB8AC3E}">
+        <p14:creationId xmlns:p14="http://schemas.microsoft.com/office/powerpoint/2010/main" val="2787958720"/>
+      </p:ext>
+    </p:extLst>
+  </p:cSld>
+  <p:clrMapOvr>
+    <a:masterClrMapping/>
+  </p:clrMapOvr>
+  <mc:AlternateContent xmlns:mc="http://schemas.openxmlformats.org/markup-compatibility/2006">
+    <mc:Choice xmlns:p14="http://schemas.microsoft.com/office/powerpoint/2010/main" Requires="p14">
+      <p:transition spd="med" p14:dur="700">
+        <p:fade/>
+      </p:transition>
+    </mc:Choice>
+    <mc:Fallback>
+      <p:transition spd="med">
+        <p:fade/>
+      </p:transition>
+    </mc:Fallback>
+  </mc:AlternateContent>
+</p:sld>
+</file>
+
+<file path=ppt/slides/slide7.xml><?xml version="1.0" encoding="utf-8"?>
+<p:sld xmlns:a="http://schemas.openxmlformats.org/drawingml/2006/main" xmlns:r="http://schemas.openxmlformats.org/officeDocument/2006/relationships" xmlns:p="http://schemas.openxmlformats.org/presentationml/2006/main">
+  <p:cSld>
+    <p:spTree>
+      <p:nvGrpSpPr>
+        <p:cNvPr id="1" name="">
+          <a:extLst>
+            <a:ext uri="{FF2B5EF4-FFF2-40B4-BE49-F238E27FC236}">
+              <a16:creationId xmlns:a16="http://schemas.microsoft.com/office/drawing/2014/main" id="{4510773F-C238-3700-7D08-5A28813975C7}"/>
+            </a:ext>
+          </a:extLst>
+        </p:cNvPr>
+        <p:cNvGrpSpPr/>
+        <p:nvPr/>
+      </p:nvGrpSpPr>
+      <p:grpSpPr>
+        <a:xfrm>
+          <a:off x="0" y="0"/>
+          <a:ext cx="0" cy="0"/>
+          <a:chOff x="0" y="0"/>
+          <a:chExt cx="0" cy="0"/>
+        </a:xfrm>
+      </p:grpSpPr>
+      <p:sp>
+        <p:nvSpPr>
+          <p:cNvPr id="13" name="Title 12">
+            <a:extLst>
+              <a:ext uri="{FF2B5EF4-FFF2-40B4-BE49-F238E27FC236}">
+                <a16:creationId xmlns:a16="http://schemas.microsoft.com/office/drawing/2014/main" id="{D43CA282-2EFB-E683-06C7-7A9593694A81}"/>
+              </a:ext>
+            </a:extLst>
+          </p:cNvPr>
+          <p:cNvSpPr>
+            <a:spLocks noGrp="1"/>
+          </p:cNvSpPr>
+          <p:nvPr>
+            <p:ph type="title"/>
+          </p:nvPr>
+        </p:nvSpPr>
+        <p:spPr>
+          <a:xfrm>
+            <a:off x="1593436" y="260649"/>
+            <a:ext cx="6174521" cy="864096"/>
+          </a:xfrm>
+        </p:spPr>
+        <p:txBody>
+          <a:bodyPr anchor="ctr">
+            <a:normAutofit fontScale="90000"/>
+          </a:bodyPr>
+          <a:lstStyle/>
+          <a:p>
+            <a:r>
+              <a:rPr lang="en-US" sz="6000" b="1" dirty="0">
+                <a:latin typeface="ADLaM Display" panose="02010000000000000000" pitchFamily="2" charset="0"/>
+                <a:ea typeface="ADLaM Display" panose="02010000000000000000" pitchFamily="2" charset="0"/>
+                <a:cs typeface="ADLaM Display" panose="02010000000000000000" pitchFamily="2" charset="0"/>
+              </a:rPr>
+              <a:t>Learning Manim</a:t>
+            </a:r>
+          </a:p>
+        </p:txBody>
+      </p:sp>
+      <p:pic>
+        <p:nvPicPr>
+          <p:cNvPr id="4" name="Picture 3">
+            <a:extLst>
+              <a:ext uri="{FF2B5EF4-FFF2-40B4-BE49-F238E27FC236}">
+                <a16:creationId xmlns:a16="http://schemas.microsoft.com/office/drawing/2014/main" id="{8C6843B9-F7CC-814A-1650-C8BBF5965D0A}"/>
+              </a:ext>
+            </a:extLst>
+          </p:cNvPr>
+          <p:cNvPicPr>
+            <a:picLocks noChangeAspect="1"/>
+          </p:cNvPicPr>
+          <p:nvPr/>
+        </p:nvPicPr>
+        <p:blipFill>
+          <a:blip r:embed="rId2"/>
+          <a:stretch>
+            <a:fillRect/>
+          </a:stretch>
+        </p:blipFill>
+        <p:spPr>
+          <a:xfrm>
+            <a:off x="7767957" y="83058"/>
+            <a:ext cx="4420868" cy="1512168"/>
+          </a:xfrm>
+          <a:prstGeom prst="rect">
+            <a:avLst/>
+          </a:prstGeom>
+        </p:spPr>
+      </p:pic>
+      <p:pic>
+        <p:nvPicPr>
+          <p:cNvPr id="5" name="Picture 4">
+            <a:extLst>
+              <a:ext uri="{FF2B5EF4-FFF2-40B4-BE49-F238E27FC236}">
+                <a16:creationId xmlns:a16="http://schemas.microsoft.com/office/drawing/2014/main" id="{4B30DE2A-FBFB-D85D-04D6-20A7D329798F}"/>
+              </a:ext>
+            </a:extLst>
+          </p:cNvPr>
+          <p:cNvPicPr>
+            <a:picLocks noChangeAspect="1"/>
+          </p:cNvPicPr>
+          <p:nvPr/>
+        </p:nvPicPr>
+        <p:blipFill>
+          <a:blip r:embed="rId3"/>
+          <a:stretch>
+            <a:fillRect/>
+          </a:stretch>
+        </p:blipFill>
+        <p:spPr>
+          <a:xfrm>
+            <a:off x="117748" y="5589240"/>
+            <a:ext cx="1152128" cy="1180931"/>
+          </a:xfrm>
+          <a:prstGeom prst="rect">
+            <a:avLst/>
+          </a:prstGeom>
+          <a:ln>
+            <a:noFill/>
+          </a:ln>
+          <a:effectLst>
+            <a:softEdge rad="112500"/>
+          </a:effectLst>
+        </p:spPr>
+      </p:pic>
+      <p:sp>
+        <p:nvSpPr>
+          <p:cNvPr id="6" name="Subtitle 2">
+            <a:extLst>
+              <a:ext uri="{FF2B5EF4-FFF2-40B4-BE49-F238E27FC236}">
+                <a16:creationId xmlns:a16="http://schemas.microsoft.com/office/drawing/2014/main" id="{63B7CD09-D1C7-B940-0376-3BFB8C7906FD}"/>
+              </a:ext>
+            </a:extLst>
+          </p:cNvPr>
+          <p:cNvSpPr txBox="1">
+            <a:spLocks/>
+          </p:cNvSpPr>
+          <p:nvPr/>
+        </p:nvSpPr>
+        <p:spPr>
+          <a:xfrm>
+            <a:off x="-1022" y="1484784"/>
+            <a:ext cx="1701923" cy="1368152"/>
+          </a:xfrm>
+          <a:prstGeom prst="rect">
+            <a:avLst/>
+          </a:prstGeom>
+        </p:spPr>
+        <p:style>
+          <a:lnRef idx="0">
+            <a:schemeClr val="accent2"/>
+          </a:lnRef>
+          <a:fillRef idx="3">
+            <a:schemeClr val="accent2"/>
+          </a:fillRef>
+          <a:effectRef idx="3">
+            <a:schemeClr val="accent2"/>
+          </a:effectRef>
+          <a:fontRef idx="minor">
+            <a:schemeClr val="lt1"/>
+          </a:fontRef>
+        </p:style>
+        <p:txBody>
+          <a:bodyPr vert="horz" lIns="91440" tIns="45720" rIns="91440" bIns="45720" rtlCol="0" anchor="ctr">
+            <a:normAutofit fontScale="92500"/>
+          </a:bodyPr>
+          <a:lstStyle>
+            <a:lvl1pPr marL="246888" indent="-246888" algn="l" defTabSz="914400" rtl="0" eaLnBrk="1" latinLnBrk="0" hangingPunct="1">
+              <a:lnSpc>
+                <a:spcPct val="90000"/>
+              </a:lnSpc>
+              <a:spcBef>
+                <a:spcPts val="1400"/>
+              </a:spcBef>
+              <a:buFont typeface="Euphemia" pitchFamily="34" charset="0"/>
+              <a:buChar char="›"/>
+              <a:defRPr sz="2800" kern="1200">
+                <a:solidFill>
+                  <a:schemeClr val="lt1"/>
+                </a:solidFill>
+                <a:latin typeface="+mn-lt"/>
+                <a:ea typeface="+mn-ea"/>
+                <a:cs typeface="+mn-cs"/>
+              </a:defRPr>
+            </a:lvl1pPr>
+            <a:lvl2pPr marL="612648" indent="-246888" algn="l" defTabSz="914400" rtl="0" eaLnBrk="1" latinLnBrk="0" hangingPunct="1">
+              <a:lnSpc>
+                <a:spcPct val="90000"/>
+              </a:lnSpc>
+              <a:spcBef>
+                <a:spcPts val="600"/>
+              </a:spcBef>
+              <a:buFont typeface="Euphemia" pitchFamily="34" charset="0"/>
+              <a:buChar char="–"/>
+              <a:defRPr sz="2400" kern="1200">
+                <a:solidFill>
+                  <a:schemeClr val="lt1"/>
+                </a:solidFill>
+                <a:latin typeface="+mn-lt"/>
+                <a:ea typeface="+mn-ea"/>
+                <a:cs typeface="+mn-cs"/>
+              </a:defRPr>
+            </a:lvl2pPr>
+            <a:lvl3pPr marL="978408" indent="-246888" algn="l" defTabSz="914400" rtl="0" eaLnBrk="1" latinLnBrk="0" hangingPunct="1">
+              <a:lnSpc>
+                <a:spcPct val="90000"/>
+              </a:lnSpc>
+              <a:spcBef>
+                <a:spcPts val="600"/>
+              </a:spcBef>
+              <a:buFont typeface="Euphemia" pitchFamily="34" charset="0"/>
+              <a:buChar char="›"/>
+              <a:defRPr sz="2000" kern="1200">
+                <a:solidFill>
+                  <a:schemeClr val="lt1"/>
+                </a:solidFill>
+                <a:latin typeface="+mn-lt"/>
+                <a:ea typeface="+mn-ea"/>
+                <a:cs typeface="+mn-cs"/>
+              </a:defRPr>
+            </a:lvl3pPr>
+            <a:lvl4pPr marL="1344168" indent="-246888" algn="l" defTabSz="914400" rtl="0" eaLnBrk="1" latinLnBrk="0" hangingPunct="1">
+              <a:lnSpc>
+                <a:spcPct val="90000"/>
+              </a:lnSpc>
+              <a:spcBef>
+                <a:spcPts val="600"/>
+              </a:spcBef>
+              <a:buFont typeface="Arial" pitchFamily="34" charset="0"/>
+              <a:buChar char="–"/>
+              <a:defRPr sz="1800" kern="1200">
+                <a:solidFill>
+                  <a:schemeClr val="lt1"/>
+                </a:solidFill>
+                <a:latin typeface="+mn-lt"/>
+                <a:ea typeface="+mn-ea"/>
+                <a:cs typeface="+mn-cs"/>
+              </a:defRPr>
+            </a:lvl4pPr>
+            <a:lvl5pPr marL="1709928" indent="-246888" algn="l" defTabSz="914400" rtl="0" eaLnBrk="1" latinLnBrk="0" hangingPunct="1">
+              <a:lnSpc>
+                <a:spcPct val="90000"/>
+              </a:lnSpc>
+              <a:spcBef>
+                <a:spcPts val="600"/>
+              </a:spcBef>
+              <a:buFont typeface="Euphemia" pitchFamily="34" charset="0"/>
+              <a:buChar char="›"/>
+              <a:defRPr sz="1800" kern="1200">
+                <a:solidFill>
+                  <a:schemeClr val="lt1"/>
+                </a:solidFill>
+                <a:latin typeface="+mn-lt"/>
+                <a:ea typeface="+mn-ea"/>
+                <a:cs typeface="+mn-cs"/>
+              </a:defRPr>
+            </a:lvl5pPr>
+            <a:lvl6pPr marL="2075688" indent="-246888" algn="l" defTabSz="914400" rtl="0" eaLnBrk="1" latinLnBrk="0" hangingPunct="1">
+              <a:lnSpc>
+                <a:spcPct val="90000"/>
+              </a:lnSpc>
+              <a:spcBef>
+                <a:spcPts val="600"/>
+              </a:spcBef>
+              <a:buFont typeface="Euphemia" pitchFamily="34" charset="0"/>
+              <a:buChar char="–"/>
+              <a:defRPr sz="1800" kern="1200">
+                <a:solidFill>
+                  <a:schemeClr val="lt1"/>
+                </a:solidFill>
+                <a:latin typeface="+mn-lt"/>
+                <a:ea typeface="+mn-ea"/>
+                <a:cs typeface="+mn-cs"/>
+              </a:defRPr>
+            </a:lvl6pPr>
+            <a:lvl7pPr marL="2441448" indent="-246888" algn="l" defTabSz="914400" rtl="0" eaLnBrk="1" latinLnBrk="0" hangingPunct="1">
+              <a:lnSpc>
+                <a:spcPct val="90000"/>
+              </a:lnSpc>
+              <a:spcBef>
+                <a:spcPts val="600"/>
+              </a:spcBef>
+              <a:buFont typeface="Euphemia" pitchFamily="34" charset="0"/>
+              <a:buChar char="›"/>
+              <a:defRPr sz="1800" kern="1200">
+                <a:solidFill>
+                  <a:schemeClr val="lt1"/>
+                </a:solidFill>
+                <a:latin typeface="+mn-lt"/>
+                <a:ea typeface="+mn-ea"/>
+                <a:cs typeface="+mn-cs"/>
+              </a:defRPr>
+            </a:lvl7pPr>
+            <a:lvl8pPr marL="2807208" indent="-246888" algn="l" defTabSz="914400" rtl="0" eaLnBrk="1" latinLnBrk="0" hangingPunct="1">
+              <a:lnSpc>
+                <a:spcPct val="90000"/>
+              </a:lnSpc>
+              <a:spcBef>
+                <a:spcPts val="600"/>
+              </a:spcBef>
+              <a:buFont typeface="Euphemia" pitchFamily="34" charset="0"/>
+              <a:buChar char="–"/>
+              <a:defRPr sz="1800" kern="1200" baseline="0">
+                <a:solidFill>
+                  <a:schemeClr val="lt1"/>
+                </a:solidFill>
+                <a:latin typeface="+mn-lt"/>
+                <a:ea typeface="+mn-ea"/>
+                <a:cs typeface="+mn-cs"/>
+              </a:defRPr>
+            </a:lvl8pPr>
+            <a:lvl9pPr marL="3172968" indent="-246888" algn="l" defTabSz="914400" rtl="0" eaLnBrk="1" latinLnBrk="0" hangingPunct="1">
+              <a:lnSpc>
+                <a:spcPct val="90000"/>
+              </a:lnSpc>
+              <a:spcBef>
+                <a:spcPts val="600"/>
+              </a:spcBef>
+              <a:buFont typeface="Euphemia" pitchFamily="34" charset="0"/>
+              <a:buChar char="›"/>
+              <a:defRPr sz="1800" kern="1200" baseline="0">
+                <a:solidFill>
+                  <a:schemeClr val="lt1"/>
+                </a:solidFill>
+                <a:latin typeface="+mn-lt"/>
+                <a:ea typeface="+mn-ea"/>
+                <a:cs typeface="+mn-cs"/>
+              </a:defRPr>
+            </a:lvl9pPr>
+          </a:lstStyle>
+          <a:p>
+            <a:pPr marL="0" indent="0" algn="ctr">
+              <a:buNone/>
+            </a:pPr>
+            <a:r>
+              <a:rPr lang="en-US" sz="7200" b="1" dirty="0">
+                <a:solidFill>
+                  <a:schemeClr val="tx2">
+                    <a:lumMod val="75000"/>
+                    <a:lumOff val="25000"/>
+                  </a:schemeClr>
+                </a:solidFill>
+              </a:rPr>
+              <a:t>007</a:t>
+            </a:r>
+          </a:p>
+        </p:txBody>
+      </p:sp>
+      <p:sp>
+        <p:nvSpPr>
+          <p:cNvPr id="9" name="Title 12">
+            <a:extLst>
+              <a:ext uri="{FF2B5EF4-FFF2-40B4-BE49-F238E27FC236}">
+                <a16:creationId xmlns:a16="http://schemas.microsoft.com/office/drawing/2014/main" id="{9FF4251C-80B9-0F14-919C-AA272BA6B128}"/>
+              </a:ext>
+            </a:extLst>
+          </p:cNvPr>
+          <p:cNvSpPr txBox="1">
+            <a:spLocks/>
+          </p:cNvSpPr>
+          <p:nvPr/>
+        </p:nvSpPr>
+        <p:spPr>
+          <a:xfrm>
+            <a:off x="1773932" y="1484783"/>
+            <a:ext cx="9782801" cy="843659"/>
+          </a:xfrm>
+          <a:prstGeom prst="rect">
+            <a:avLst/>
+          </a:prstGeom>
+        </p:spPr>
+        <p:txBody>
+          <a:bodyPr vert="horz" lIns="91440" tIns="45720" rIns="91440" bIns="45720" rtlCol="0" anchor="ctr">
+            <a:normAutofit fontScale="97500"/>
+          </a:bodyPr>
+          <a:lstStyle>
+            <a:lvl1pPr algn="l" defTabSz="914400" rtl="0" eaLnBrk="1" latinLnBrk="0" hangingPunct="1">
+              <a:lnSpc>
+                <a:spcPct val="90000"/>
+              </a:lnSpc>
+              <a:spcBef>
+                <a:spcPct val="0"/>
+              </a:spcBef>
+              <a:buNone/>
+              <a:defRPr sz="3600" kern="1200">
+                <a:solidFill>
+                  <a:schemeClr val="tx1">
+                    <a:lumMod val="75000"/>
+                  </a:schemeClr>
+                </a:solidFill>
+                <a:latin typeface="+mj-lt"/>
+                <a:ea typeface="+mj-ea"/>
+                <a:cs typeface="+mj-cs"/>
+              </a:defRPr>
+            </a:lvl1pPr>
+          </a:lstStyle>
+          <a:p>
+            <a:r>
+              <a:rPr lang="en-US" sz="4800" b="1" dirty="0"/>
+              <a:t>Example: Continuous Motion</a:t>
+            </a:r>
+          </a:p>
+        </p:txBody>
+      </p:sp>
+      <p:pic>
+        <p:nvPicPr>
+          <p:cNvPr id="3" name="Picture 2">
+            <a:extLst>
+              <a:ext uri="{FF2B5EF4-FFF2-40B4-BE49-F238E27FC236}">
+                <a16:creationId xmlns:a16="http://schemas.microsoft.com/office/drawing/2014/main" id="{BFF142A3-45BE-7C17-DDDC-1CBF398C7662}"/>
+              </a:ext>
+            </a:extLst>
+          </p:cNvPr>
+          <p:cNvPicPr>
+            <a:picLocks noChangeAspect="1"/>
+          </p:cNvPicPr>
+          <p:nvPr/>
+        </p:nvPicPr>
+        <p:blipFill>
+          <a:blip r:embed="rId4"/>
+          <a:stretch>
+            <a:fillRect/>
+          </a:stretch>
+        </p:blipFill>
+        <p:spPr>
+          <a:xfrm>
+            <a:off x="2566020" y="2323388"/>
+            <a:ext cx="7488832" cy="4393805"/>
+          </a:xfrm>
+          <a:prstGeom prst="rect">
+            <a:avLst/>
+          </a:prstGeom>
+          <a:ln>
+            <a:noFill/>
+          </a:ln>
+          <a:effectLst>
+            <a:outerShdw blurRad="292100" dist="139700" dir="2700000" algn="tl" rotWithShape="0">
+              <a:srgbClr val="333333">
+                <a:alpha val="65000"/>
+              </a:srgbClr>
+            </a:outerShdw>
+          </a:effectLst>
+        </p:spPr>
+      </p:pic>
+    </p:spTree>
+    <p:extLst>
+      <p:ext uri="{BB962C8B-B14F-4D97-AF65-F5344CB8AC3E}">
+        <p14:creationId xmlns:p14="http://schemas.microsoft.com/office/powerpoint/2010/main" val="2667531005"/>
+      </p:ext>
+    </p:extLst>
+  </p:cSld>
+  <p:clrMapOvr>
+    <a:masterClrMapping/>
+  </p:clrMapOvr>
+  <mc:AlternateContent xmlns:mc="http://schemas.openxmlformats.org/markup-compatibility/2006">
+    <mc:Choice xmlns:p14="http://schemas.microsoft.com/office/powerpoint/2010/main" Requires="p14">
+      <p:transition spd="med" p14:dur="700">
+        <p:fade/>
+      </p:transition>
+    </mc:Choice>
+    <mc:Fallback>
+      <p:transition spd="med">
+        <p:fade/>
+      </p:transition>
+    </mc:Fallback>
+  </mc:AlternateContent>
+</p:sld>
+</file>
+
+<file path=ppt/slides/slide8.xml><?xml version="1.0" encoding="utf-8"?>
+<p:sld xmlns:a="http://schemas.openxmlformats.org/drawingml/2006/main" xmlns:r="http://schemas.openxmlformats.org/officeDocument/2006/relationships" xmlns:p="http://schemas.openxmlformats.org/presentationml/2006/main">
+  <p:cSld>
+    <p:spTree>
+      <p:nvGrpSpPr>
+        <p:cNvPr id="1" name="">
+          <a:extLst>
+            <a:ext uri="{FF2B5EF4-FFF2-40B4-BE49-F238E27FC236}">
+              <a16:creationId xmlns:a16="http://schemas.microsoft.com/office/drawing/2014/main" id="{094C8847-9238-F6D8-447B-58C8A4DC5292}"/>
+            </a:ext>
+          </a:extLst>
+        </p:cNvPr>
+        <p:cNvGrpSpPr/>
+        <p:nvPr/>
+      </p:nvGrpSpPr>
+      <p:grpSpPr>
+        <a:xfrm>
+          <a:off x="0" y="0"/>
+          <a:ext cx="0" cy="0"/>
+          <a:chOff x="0" y="0"/>
+          <a:chExt cx="0" cy="0"/>
+        </a:xfrm>
+      </p:grpSpPr>
+      <p:sp>
+        <p:nvSpPr>
+          <p:cNvPr id="13" name="Title 12">
+            <a:extLst>
+              <a:ext uri="{FF2B5EF4-FFF2-40B4-BE49-F238E27FC236}">
+                <a16:creationId xmlns:a16="http://schemas.microsoft.com/office/drawing/2014/main" id="{A2E8B1E1-F29A-D7B8-C636-6C42DF44B963}"/>
+              </a:ext>
+            </a:extLst>
+          </p:cNvPr>
+          <p:cNvSpPr>
+            <a:spLocks noGrp="1"/>
+          </p:cNvSpPr>
+          <p:nvPr>
+            <p:ph type="title"/>
+          </p:nvPr>
+        </p:nvSpPr>
+        <p:spPr>
+          <a:xfrm>
+            <a:off x="1593436" y="260649"/>
+            <a:ext cx="6174521" cy="864096"/>
+          </a:xfrm>
+        </p:spPr>
+        <p:txBody>
+          <a:bodyPr anchor="ctr">
+            <a:normAutofit fontScale="90000"/>
+          </a:bodyPr>
+          <a:lstStyle/>
+          <a:p>
+            <a:r>
+              <a:rPr lang="en-US" sz="6000" b="1" dirty="0">
+                <a:latin typeface="ADLaM Display" panose="02010000000000000000" pitchFamily="2" charset="0"/>
+                <a:ea typeface="ADLaM Display" panose="02010000000000000000" pitchFamily="2" charset="0"/>
+                <a:cs typeface="ADLaM Display" panose="02010000000000000000" pitchFamily="2" charset="0"/>
+              </a:rPr>
+              <a:t>Learning Manim</a:t>
+            </a:r>
+          </a:p>
+        </p:txBody>
+      </p:sp>
+      <p:pic>
+        <p:nvPicPr>
+          <p:cNvPr id="4" name="Picture 3">
+            <a:extLst>
+              <a:ext uri="{FF2B5EF4-FFF2-40B4-BE49-F238E27FC236}">
+                <a16:creationId xmlns:a16="http://schemas.microsoft.com/office/drawing/2014/main" id="{D6EEA777-889B-9772-9005-FE3D636BD35E}"/>
+              </a:ext>
+            </a:extLst>
+          </p:cNvPr>
+          <p:cNvPicPr>
+            <a:picLocks noChangeAspect="1"/>
+          </p:cNvPicPr>
+          <p:nvPr/>
+        </p:nvPicPr>
+        <p:blipFill>
+          <a:blip r:embed="rId2"/>
+          <a:stretch>
+            <a:fillRect/>
+          </a:stretch>
+        </p:blipFill>
+        <p:spPr>
+          <a:xfrm>
+            <a:off x="7767957" y="83058"/>
+            <a:ext cx="4420868" cy="1512168"/>
+          </a:xfrm>
+          <a:prstGeom prst="rect">
+            <a:avLst/>
+          </a:prstGeom>
+        </p:spPr>
+      </p:pic>
+      <p:pic>
+        <p:nvPicPr>
+          <p:cNvPr id="5" name="Picture 4">
+            <a:extLst>
+              <a:ext uri="{FF2B5EF4-FFF2-40B4-BE49-F238E27FC236}">
+                <a16:creationId xmlns:a16="http://schemas.microsoft.com/office/drawing/2014/main" id="{BCADD321-874B-7495-2820-D67E015AADEE}"/>
+              </a:ext>
+            </a:extLst>
+          </p:cNvPr>
+          <p:cNvPicPr>
+            <a:picLocks noChangeAspect="1"/>
+          </p:cNvPicPr>
+          <p:nvPr/>
+        </p:nvPicPr>
+        <p:blipFill>
+          <a:blip r:embed="rId3"/>
+          <a:stretch>
+            <a:fillRect/>
+          </a:stretch>
+        </p:blipFill>
+        <p:spPr>
+          <a:xfrm>
+            <a:off x="117748" y="5589240"/>
+            <a:ext cx="1152128" cy="1180931"/>
+          </a:xfrm>
+          <a:prstGeom prst="rect">
+            <a:avLst/>
+          </a:prstGeom>
+          <a:ln>
+            <a:noFill/>
+          </a:ln>
+          <a:effectLst>
+            <a:softEdge rad="112500"/>
+          </a:effectLst>
+        </p:spPr>
+      </p:pic>
+      <p:sp>
+        <p:nvSpPr>
+          <p:cNvPr id="6" name="Subtitle 2">
+            <a:extLst>
+              <a:ext uri="{FF2B5EF4-FFF2-40B4-BE49-F238E27FC236}">
+                <a16:creationId xmlns:a16="http://schemas.microsoft.com/office/drawing/2014/main" id="{FF814DDB-C619-1C42-6CBF-5157C6720186}"/>
+              </a:ext>
+            </a:extLst>
+          </p:cNvPr>
+          <p:cNvSpPr txBox="1">
+            <a:spLocks/>
+          </p:cNvSpPr>
+          <p:nvPr/>
+        </p:nvSpPr>
+        <p:spPr>
+          <a:xfrm>
+            <a:off x="-1022" y="1484784"/>
+            <a:ext cx="1701923" cy="1368152"/>
+          </a:xfrm>
+          <a:prstGeom prst="rect">
+            <a:avLst/>
+          </a:prstGeom>
+        </p:spPr>
+        <p:style>
+          <a:lnRef idx="0">
+            <a:schemeClr val="accent2"/>
+          </a:lnRef>
+          <a:fillRef idx="3">
+            <a:schemeClr val="accent2"/>
+          </a:fillRef>
+          <a:effectRef idx="3">
+            <a:schemeClr val="accent2"/>
+          </a:effectRef>
+          <a:fontRef idx="minor">
+            <a:schemeClr val="lt1"/>
+          </a:fontRef>
+        </p:style>
+        <p:txBody>
+          <a:bodyPr vert="horz" lIns="91440" tIns="45720" rIns="91440" bIns="45720" rtlCol="0" anchor="ctr">
+            <a:normAutofit fontScale="92500"/>
+          </a:bodyPr>
+          <a:lstStyle>
+            <a:lvl1pPr marL="246888" indent="-246888" algn="l" defTabSz="914400" rtl="0" eaLnBrk="1" latinLnBrk="0" hangingPunct="1">
+              <a:lnSpc>
+                <a:spcPct val="90000"/>
+              </a:lnSpc>
+              <a:spcBef>
+                <a:spcPts val="1400"/>
+              </a:spcBef>
+              <a:buFont typeface="Euphemia" pitchFamily="34" charset="0"/>
+              <a:buChar char="›"/>
+              <a:defRPr sz="2800" kern="1200">
+                <a:solidFill>
+                  <a:schemeClr val="lt1"/>
+                </a:solidFill>
+                <a:latin typeface="+mn-lt"/>
+                <a:ea typeface="+mn-ea"/>
+                <a:cs typeface="+mn-cs"/>
+              </a:defRPr>
+            </a:lvl1pPr>
+            <a:lvl2pPr marL="612648" indent="-246888" algn="l" defTabSz="914400" rtl="0" eaLnBrk="1" latinLnBrk="0" hangingPunct="1">
+              <a:lnSpc>
+                <a:spcPct val="90000"/>
+              </a:lnSpc>
+              <a:spcBef>
+                <a:spcPts val="600"/>
+              </a:spcBef>
+              <a:buFont typeface="Euphemia" pitchFamily="34" charset="0"/>
+              <a:buChar char="–"/>
+              <a:defRPr sz="2400" kern="1200">
+                <a:solidFill>
+                  <a:schemeClr val="lt1"/>
+                </a:solidFill>
+                <a:latin typeface="+mn-lt"/>
+                <a:ea typeface="+mn-ea"/>
+                <a:cs typeface="+mn-cs"/>
+              </a:defRPr>
+            </a:lvl2pPr>
+            <a:lvl3pPr marL="978408" indent="-246888" algn="l" defTabSz="914400" rtl="0" eaLnBrk="1" latinLnBrk="0" hangingPunct="1">
+              <a:lnSpc>
+                <a:spcPct val="90000"/>
+              </a:lnSpc>
+              <a:spcBef>
+                <a:spcPts val="600"/>
+              </a:spcBef>
+              <a:buFont typeface="Euphemia" pitchFamily="34" charset="0"/>
+              <a:buChar char="›"/>
+              <a:defRPr sz="2000" kern="1200">
+                <a:solidFill>
+                  <a:schemeClr val="lt1"/>
+                </a:solidFill>
+                <a:latin typeface="+mn-lt"/>
+                <a:ea typeface="+mn-ea"/>
+                <a:cs typeface="+mn-cs"/>
+              </a:defRPr>
+            </a:lvl3pPr>
+            <a:lvl4pPr marL="1344168" indent="-246888" algn="l" defTabSz="914400" rtl="0" eaLnBrk="1" latinLnBrk="0" hangingPunct="1">
+              <a:lnSpc>
+                <a:spcPct val="90000"/>
+              </a:lnSpc>
+              <a:spcBef>
+                <a:spcPts val="600"/>
+              </a:spcBef>
+              <a:buFont typeface="Arial" pitchFamily="34" charset="0"/>
+              <a:buChar char="–"/>
+              <a:defRPr sz="1800" kern="1200">
+                <a:solidFill>
+                  <a:schemeClr val="lt1"/>
+                </a:solidFill>
+                <a:latin typeface="+mn-lt"/>
+                <a:ea typeface="+mn-ea"/>
+                <a:cs typeface="+mn-cs"/>
+              </a:defRPr>
+            </a:lvl4pPr>
+            <a:lvl5pPr marL="1709928" indent="-246888" algn="l" defTabSz="914400" rtl="0" eaLnBrk="1" latinLnBrk="0" hangingPunct="1">
+              <a:lnSpc>
+                <a:spcPct val="90000"/>
+              </a:lnSpc>
+              <a:spcBef>
+                <a:spcPts val="600"/>
+              </a:spcBef>
+              <a:buFont typeface="Euphemia" pitchFamily="34" charset="0"/>
+              <a:buChar char="›"/>
+              <a:defRPr sz="1800" kern="1200">
+                <a:solidFill>
+                  <a:schemeClr val="lt1"/>
+                </a:solidFill>
+                <a:latin typeface="+mn-lt"/>
+                <a:ea typeface="+mn-ea"/>
+                <a:cs typeface="+mn-cs"/>
+              </a:defRPr>
+            </a:lvl5pPr>
+            <a:lvl6pPr marL="2075688" indent="-246888" algn="l" defTabSz="914400" rtl="0" eaLnBrk="1" latinLnBrk="0" hangingPunct="1">
+              <a:lnSpc>
+                <a:spcPct val="90000"/>
+              </a:lnSpc>
+              <a:spcBef>
+                <a:spcPts val="600"/>
+              </a:spcBef>
+              <a:buFont typeface="Euphemia" pitchFamily="34" charset="0"/>
+              <a:buChar char="–"/>
+              <a:defRPr sz="1800" kern="1200">
+                <a:solidFill>
+                  <a:schemeClr val="lt1"/>
+                </a:solidFill>
+                <a:latin typeface="+mn-lt"/>
+                <a:ea typeface="+mn-ea"/>
+                <a:cs typeface="+mn-cs"/>
+              </a:defRPr>
+            </a:lvl6pPr>
+            <a:lvl7pPr marL="2441448" indent="-246888" algn="l" defTabSz="914400" rtl="0" eaLnBrk="1" latinLnBrk="0" hangingPunct="1">
+              <a:lnSpc>
+                <a:spcPct val="90000"/>
+              </a:lnSpc>
+              <a:spcBef>
+                <a:spcPts val="600"/>
+              </a:spcBef>
+              <a:buFont typeface="Euphemia" pitchFamily="34" charset="0"/>
+              <a:buChar char="›"/>
+              <a:defRPr sz="1800" kern="1200">
+                <a:solidFill>
+                  <a:schemeClr val="lt1"/>
+                </a:solidFill>
+                <a:latin typeface="+mn-lt"/>
+                <a:ea typeface="+mn-ea"/>
+                <a:cs typeface="+mn-cs"/>
+              </a:defRPr>
+            </a:lvl7pPr>
+            <a:lvl8pPr marL="2807208" indent="-246888" algn="l" defTabSz="914400" rtl="0" eaLnBrk="1" latinLnBrk="0" hangingPunct="1">
+              <a:lnSpc>
+                <a:spcPct val="90000"/>
+              </a:lnSpc>
+              <a:spcBef>
+                <a:spcPts val="600"/>
+              </a:spcBef>
+              <a:buFont typeface="Euphemia" pitchFamily="34" charset="0"/>
+              <a:buChar char="–"/>
+              <a:defRPr sz="1800" kern="1200" baseline="0">
+                <a:solidFill>
+                  <a:schemeClr val="lt1"/>
+                </a:solidFill>
+                <a:latin typeface="+mn-lt"/>
+                <a:ea typeface="+mn-ea"/>
+                <a:cs typeface="+mn-cs"/>
+              </a:defRPr>
+            </a:lvl8pPr>
+            <a:lvl9pPr marL="3172968" indent="-246888" algn="l" defTabSz="914400" rtl="0" eaLnBrk="1" latinLnBrk="0" hangingPunct="1">
+              <a:lnSpc>
+                <a:spcPct val="90000"/>
+              </a:lnSpc>
+              <a:spcBef>
+                <a:spcPts val="600"/>
+              </a:spcBef>
+              <a:buFont typeface="Euphemia" pitchFamily="34" charset="0"/>
+              <a:buChar char="›"/>
+              <a:defRPr sz="1800" kern="1200" baseline="0">
+                <a:solidFill>
+                  <a:schemeClr val="lt1"/>
+                </a:solidFill>
+                <a:latin typeface="+mn-lt"/>
+                <a:ea typeface="+mn-ea"/>
+                <a:cs typeface="+mn-cs"/>
+              </a:defRPr>
+            </a:lvl9pPr>
+          </a:lstStyle>
+          <a:p>
+            <a:pPr marL="0" indent="0" algn="ctr">
+              <a:buNone/>
+            </a:pPr>
+            <a:r>
+              <a:rPr lang="en-US" sz="7200" b="1" dirty="0">
+                <a:solidFill>
+                  <a:schemeClr val="tx2">
+                    <a:lumMod val="75000"/>
+                    <a:lumOff val="25000"/>
+                  </a:schemeClr>
+                </a:solidFill>
+              </a:rPr>
+              <a:t>008</a:t>
+            </a:r>
+          </a:p>
+        </p:txBody>
+      </p:sp>
+      <p:sp>
+        <p:nvSpPr>
+          <p:cNvPr id="9" name="Title 12">
+            <a:extLst>
+              <a:ext uri="{FF2B5EF4-FFF2-40B4-BE49-F238E27FC236}">
+                <a16:creationId xmlns:a16="http://schemas.microsoft.com/office/drawing/2014/main" id="{30F3A660-B94C-C1CD-DFEF-793C0865B9D3}"/>
+              </a:ext>
+            </a:extLst>
+          </p:cNvPr>
+          <p:cNvSpPr txBox="1">
+            <a:spLocks/>
+          </p:cNvSpPr>
+          <p:nvPr/>
+        </p:nvSpPr>
+        <p:spPr>
+          <a:xfrm>
+            <a:off x="1773932" y="1124744"/>
+            <a:ext cx="9782801" cy="843659"/>
+          </a:xfrm>
+          <a:prstGeom prst="rect">
+            <a:avLst/>
+          </a:prstGeom>
+        </p:spPr>
+        <p:txBody>
+          <a:bodyPr vert="horz" lIns="91440" tIns="45720" rIns="91440" bIns="45720" rtlCol="0" anchor="ctr">
+            <a:normAutofit fontScale="97500"/>
+          </a:bodyPr>
+          <a:lstStyle>
+            <a:lvl1pPr algn="l" defTabSz="914400" rtl="0" eaLnBrk="1" latinLnBrk="0" hangingPunct="1">
+              <a:lnSpc>
+                <a:spcPct val="90000"/>
+              </a:lnSpc>
+              <a:spcBef>
+                <a:spcPct val="0"/>
+              </a:spcBef>
+              <a:buNone/>
+              <a:defRPr sz="3600" kern="1200">
+                <a:solidFill>
+                  <a:schemeClr val="tx1">
+                    <a:lumMod val="75000"/>
+                  </a:schemeClr>
+                </a:solidFill>
+                <a:latin typeface="+mj-lt"/>
+                <a:ea typeface="+mj-ea"/>
+                <a:cs typeface="+mj-cs"/>
+              </a:defRPr>
+            </a:lvl1pPr>
+          </a:lstStyle>
+          <a:p>
+            <a:r>
+              <a:rPr lang="en-US" sz="4800" b="1" dirty="0"/>
+              <a:t>Example: Opening Manim</a:t>
+            </a:r>
+          </a:p>
+        </p:txBody>
+      </p:sp>
+      <p:pic>
+        <p:nvPicPr>
+          <p:cNvPr id="7" name="Picture 6">
+            <a:extLst>
+              <a:ext uri="{FF2B5EF4-FFF2-40B4-BE49-F238E27FC236}">
+                <a16:creationId xmlns:a16="http://schemas.microsoft.com/office/drawing/2014/main" id="{E691A570-E63C-E0F6-E113-363D445852B8}"/>
+              </a:ext>
+            </a:extLst>
+          </p:cNvPr>
+          <p:cNvPicPr>
+            <a:picLocks noChangeAspect="1"/>
+          </p:cNvPicPr>
+          <p:nvPr/>
+        </p:nvPicPr>
+        <p:blipFill>
+          <a:blip r:embed="rId4"/>
+          <a:stretch>
+            <a:fillRect/>
+          </a:stretch>
+        </p:blipFill>
+        <p:spPr>
+          <a:xfrm>
+            <a:off x="2349996" y="1949744"/>
+            <a:ext cx="8173455" cy="4781798"/>
+          </a:xfrm>
+          <a:prstGeom prst="rect">
+            <a:avLst/>
+          </a:prstGeom>
+          <a:ln>
+            <a:noFill/>
+          </a:ln>
+          <a:effectLst>
+            <a:outerShdw blurRad="292100" dist="139700" dir="2700000" algn="tl" rotWithShape="0">
+              <a:srgbClr val="333333">
+                <a:alpha val="65000"/>
+              </a:srgbClr>
+            </a:outerShdw>
+          </a:effectLst>
+        </p:spPr>
+      </p:pic>
+    </p:spTree>
+    <p:extLst>
+      <p:ext uri="{BB962C8B-B14F-4D97-AF65-F5344CB8AC3E}">
+        <p14:creationId xmlns:p14="http://schemas.microsoft.com/office/powerpoint/2010/main" val="2527647917"/>
+      </p:ext>
+    </p:extLst>
+  </p:cSld>
+  <p:clrMapOvr>
+    <a:masterClrMapping/>
+  </p:clrMapOvr>
+  <mc:AlternateContent xmlns:mc="http://schemas.openxmlformats.org/markup-compatibility/2006">
+    <mc:Choice xmlns:p14="http://schemas.microsoft.com/office/powerpoint/2010/main" Requires="p14">
+      <p:transition spd="med" p14:dur="700">
+        <p:fade/>
+      </p:transition>
+    </mc:Choice>
+    <mc:Fallback>
+      <p:transition spd="med">
+        <p:fade/>
+      </p:transition>
+    </mc:Fallback>
+  </mc:AlternateContent>
+</p:sld>
+</file>
+
+<file path=ppt/slides/slide9.xml><?xml version="1.0" encoding="utf-8"?>
+<p:sld xmlns:a="http://schemas.openxmlformats.org/drawingml/2006/main" xmlns:r="http://schemas.openxmlformats.org/officeDocument/2006/relationships" xmlns:p="http://schemas.openxmlformats.org/presentationml/2006/main">
+  <p:cSld>
+    <p:spTree>
+      <p:nvGrpSpPr>
+        <p:cNvPr id="1" name="">
+          <a:extLst>
+            <a:ext uri="{FF2B5EF4-FFF2-40B4-BE49-F238E27FC236}">
+              <a16:creationId xmlns:a16="http://schemas.microsoft.com/office/drawing/2014/main" id="{603683ED-BCC0-26B2-AEF1-A980A12CEC59}"/>
+            </a:ext>
+          </a:extLst>
+        </p:cNvPr>
+        <p:cNvGrpSpPr/>
+        <p:nvPr/>
+      </p:nvGrpSpPr>
+      <p:grpSpPr>
+        <a:xfrm>
+          <a:off x="0" y="0"/>
+          <a:ext cx="0" cy="0"/>
+          <a:chOff x="0" y="0"/>
+          <a:chExt cx="0" cy="0"/>
+        </a:xfrm>
+      </p:grpSpPr>
+      <p:sp>
+        <p:nvSpPr>
+          <p:cNvPr id="13" name="Title 12">
+            <a:extLst>
+              <a:ext uri="{FF2B5EF4-FFF2-40B4-BE49-F238E27FC236}">
+                <a16:creationId xmlns:a16="http://schemas.microsoft.com/office/drawing/2014/main" id="{9867626C-0580-A6D2-B72E-7AC9C7F609EA}"/>
+              </a:ext>
+            </a:extLst>
+          </p:cNvPr>
+          <p:cNvSpPr>
+            <a:spLocks noGrp="1"/>
+          </p:cNvSpPr>
+          <p:nvPr>
+            <p:ph type="title"/>
+          </p:nvPr>
+        </p:nvSpPr>
+        <p:spPr>
+          <a:xfrm>
+            <a:off x="1593436" y="260649"/>
+            <a:ext cx="6174521" cy="864096"/>
+          </a:xfrm>
+        </p:spPr>
+        <p:txBody>
+          <a:bodyPr anchor="ctr">
+            <a:normAutofit fontScale="90000"/>
+          </a:bodyPr>
+          <a:lstStyle/>
+          <a:p>
+            <a:r>
+              <a:rPr lang="en-US" sz="6000" b="1" dirty="0">
+                <a:latin typeface="ADLaM Display" panose="02010000000000000000" pitchFamily="2" charset="0"/>
+                <a:ea typeface="ADLaM Display" panose="02010000000000000000" pitchFamily="2" charset="0"/>
+                <a:cs typeface="ADLaM Display" panose="02010000000000000000" pitchFamily="2" charset="0"/>
+              </a:rPr>
+              <a:t>Learning Manim</a:t>
+            </a:r>
+          </a:p>
+        </p:txBody>
+      </p:sp>
+      <p:pic>
+        <p:nvPicPr>
+          <p:cNvPr id="4" name="Picture 3">
+            <a:extLst>
+              <a:ext uri="{FF2B5EF4-FFF2-40B4-BE49-F238E27FC236}">
+                <a16:creationId xmlns:a16="http://schemas.microsoft.com/office/drawing/2014/main" id="{CEFCBC13-829C-8A42-D1B0-BC597F2C30B0}"/>
+              </a:ext>
+            </a:extLst>
+          </p:cNvPr>
+          <p:cNvPicPr>
+            <a:picLocks noChangeAspect="1"/>
+          </p:cNvPicPr>
+          <p:nvPr/>
+        </p:nvPicPr>
+        <p:blipFill>
+          <a:blip r:embed="rId2"/>
+          <a:stretch>
+            <a:fillRect/>
+          </a:stretch>
+        </p:blipFill>
+        <p:spPr>
+          <a:xfrm>
+            <a:off x="7767957" y="83058"/>
+            <a:ext cx="4420868" cy="1512168"/>
+          </a:xfrm>
+          <a:prstGeom prst="rect">
+            <a:avLst/>
+          </a:prstGeom>
+        </p:spPr>
+      </p:pic>
+      <p:pic>
+        <p:nvPicPr>
+          <p:cNvPr id="5" name="Picture 4">
+            <a:extLst>
+              <a:ext uri="{FF2B5EF4-FFF2-40B4-BE49-F238E27FC236}">
+                <a16:creationId xmlns:a16="http://schemas.microsoft.com/office/drawing/2014/main" id="{CC58D251-F46F-D079-D542-F228A97563E7}"/>
+              </a:ext>
+            </a:extLst>
+          </p:cNvPr>
+          <p:cNvPicPr>
+            <a:picLocks noChangeAspect="1"/>
+          </p:cNvPicPr>
+          <p:nvPr/>
+        </p:nvPicPr>
+        <p:blipFill>
+          <a:blip r:embed="rId3"/>
+          <a:stretch>
+            <a:fillRect/>
+          </a:stretch>
+        </p:blipFill>
+        <p:spPr>
+          <a:xfrm>
+            <a:off x="117748" y="5589240"/>
+            <a:ext cx="1152128" cy="1180931"/>
+          </a:xfrm>
+          <a:prstGeom prst="rect">
+            <a:avLst/>
+          </a:prstGeom>
+          <a:ln>
+            <a:noFill/>
+          </a:ln>
+          <a:effectLst>
+            <a:softEdge rad="112500"/>
+          </a:effectLst>
+        </p:spPr>
+      </p:pic>
+      <p:sp>
+        <p:nvSpPr>
+          <p:cNvPr id="6" name="Subtitle 2">
+            <a:extLst>
+              <a:ext uri="{FF2B5EF4-FFF2-40B4-BE49-F238E27FC236}">
+                <a16:creationId xmlns:a16="http://schemas.microsoft.com/office/drawing/2014/main" id="{D0CA555D-7F3B-F2C5-E2A9-2C069901EFAC}"/>
+              </a:ext>
+            </a:extLst>
+          </p:cNvPr>
+          <p:cNvSpPr txBox="1">
+            <a:spLocks/>
+          </p:cNvSpPr>
+          <p:nvPr/>
+        </p:nvSpPr>
+        <p:spPr>
+          <a:xfrm>
+            <a:off x="-1022" y="1484784"/>
+            <a:ext cx="1701923" cy="1368152"/>
+          </a:xfrm>
+          <a:prstGeom prst="rect">
+            <a:avLst/>
+          </a:prstGeom>
+        </p:spPr>
+        <p:style>
+          <a:lnRef idx="0">
+            <a:schemeClr val="accent2"/>
+          </a:lnRef>
+          <a:fillRef idx="3">
+            <a:schemeClr val="accent2"/>
+          </a:fillRef>
+          <a:effectRef idx="3">
+            <a:schemeClr val="accent2"/>
+          </a:effectRef>
+          <a:fontRef idx="minor">
+            <a:schemeClr val="lt1"/>
+          </a:fontRef>
+        </p:style>
+        <p:txBody>
+          <a:bodyPr vert="horz" lIns="91440" tIns="45720" rIns="91440" bIns="45720" rtlCol="0" anchor="ctr">
+            <a:normAutofit fontScale="92500"/>
+          </a:bodyPr>
+          <a:lstStyle>
+            <a:lvl1pPr marL="246888" indent="-246888" algn="l" defTabSz="914400" rtl="0" eaLnBrk="1" latinLnBrk="0" hangingPunct="1">
+              <a:lnSpc>
+                <a:spcPct val="90000"/>
+              </a:lnSpc>
+              <a:spcBef>
+                <a:spcPts val="1400"/>
+              </a:spcBef>
+              <a:buFont typeface="Euphemia" pitchFamily="34" charset="0"/>
+              <a:buChar char="›"/>
+              <a:defRPr sz="2800" kern="1200">
+                <a:solidFill>
+                  <a:schemeClr val="lt1"/>
+                </a:solidFill>
+                <a:latin typeface="+mn-lt"/>
+                <a:ea typeface="+mn-ea"/>
+                <a:cs typeface="+mn-cs"/>
+              </a:defRPr>
+            </a:lvl1pPr>
+            <a:lvl2pPr marL="612648" indent="-246888" algn="l" defTabSz="914400" rtl="0" eaLnBrk="1" latinLnBrk="0" hangingPunct="1">
+              <a:lnSpc>
+                <a:spcPct val="90000"/>
+              </a:lnSpc>
+              <a:spcBef>
+                <a:spcPts val="600"/>
+              </a:spcBef>
+              <a:buFont typeface="Euphemia" pitchFamily="34" charset="0"/>
+              <a:buChar char="–"/>
+              <a:defRPr sz="2400" kern="1200">
+                <a:solidFill>
+                  <a:schemeClr val="lt1"/>
+                </a:solidFill>
+                <a:latin typeface="+mn-lt"/>
+                <a:ea typeface="+mn-ea"/>
+                <a:cs typeface="+mn-cs"/>
+              </a:defRPr>
+            </a:lvl2pPr>
+            <a:lvl3pPr marL="978408" indent="-246888" algn="l" defTabSz="914400" rtl="0" eaLnBrk="1" latinLnBrk="0" hangingPunct="1">
+              <a:lnSpc>
+                <a:spcPct val="90000"/>
+              </a:lnSpc>
+              <a:spcBef>
+                <a:spcPts val="600"/>
+              </a:spcBef>
+              <a:buFont typeface="Euphemia" pitchFamily="34" charset="0"/>
+              <a:buChar char="›"/>
+              <a:defRPr sz="2000" kern="1200">
+                <a:solidFill>
+                  <a:schemeClr val="lt1"/>
+                </a:solidFill>
+                <a:latin typeface="+mn-lt"/>
+                <a:ea typeface="+mn-ea"/>
+                <a:cs typeface="+mn-cs"/>
+              </a:defRPr>
+            </a:lvl3pPr>
+            <a:lvl4pPr marL="1344168" indent="-246888" algn="l" defTabSz="914400" rtl="0" eaLnBrk="1" latinLnBrk="0" hangingPunct="1">
+              <a:lnSpc>
+                <a:spcPct val="90000"/>
+              </a:lnSpc>
+              <a:spcBef>
+                <a:spcPts val="600"/>
+              </a:spcBef>
+              <a:buFont typeface="Arial" pitchFamily="34" charset="0"/>
+              <a:buChar char="–"/>
+              <a:defRPr sz="1800" kern="1200">
+                <a:solidFill>
+                  <a:schemeClr val="lt1"/>
+                </a:solidFill>
+                <a:latin typeface="+mn-lt"/>
+                <a:ea typeface="+mn-ea"/>
+                <a:cs typeface="+mn-cs"/>
+              </a:defRPr>
+            </a:lvl4pPr>
+            <a:lvl5pPr marL="1709928" indent="-246888" algn="l" defTabSz="914400" rtl="0" eaLnBrk="1" latinLnBrk="0" hangingPunct="1">
+              <a:lnSpc>
+                <a:spcPct val="90000"/>
+              </a:lnSpc>
+              <a:spcBef>
+                <a:spcPts val="600"/>
+              </a:spcBef>
+              <a:buFont typeface="Euphemia" pitchFamily="34" charset="0"/>
+              <a:buChar char="›"/>
+              <a:defRPr sz="1800" kern="1200">
+                <a:solidFill>
+                  <a:schemeClr val="lt1"/>
+                </a:solidFill>
+                <a:latin typeface="+mn-lt"/>
+                <a:ea typeface="+mn-ea"/>
+                <a:cs typeface="+mn-cs"/>
+              </a:defRPr>
+            </a:lvl5pPr>
+            <a:lvl6pPr marL="2075688" indent="-246888" algn="l" defTabSz="914400" rtl="0" eaLnBrk="1" latinLnBrk="0" hangingPunct="1">
+              <a:lnSpc>
+                <a:spcPct val="90000"/>
+              </a:lnSpc>
+              <a:spcBef>
+                <a:spcPts val="600"/>
+              </a:spcBef>
+              <a:buFont typeface="Euphemia" pitchFamily="34" charset="0"/>
+              <a:buChar char="–"/>
+              <a:defRPr sz="1800" kern="1200">
+                <a:solidFill>
+                  <a:schemeClr val="lt1"/>
+                </a:solidFill>
+                <a:latin typeface="+mn-lt"/>
+                <a:ea typeface="+mn-ea"/>
+                <a:cs typeface="+mn-cs"/>
+              </a:defRPr>
+            </a:lvl6pPr>
+            <a:lvl7pPr marL="2441448" indent="-246888" algn="l" defTabSz="914400" rtl="0" eaLnBrk="1" latinLnBrk="0" hangingPunct="1">
+              <a:lnSpc>
+                <a:spcPct val="90000"/>
+              </a:lnSpc>
+              <a:spcBef>
+                <a:spcPts val="600"/>
+              </a:spcBef>
+              <a:buFont typeface="Euphemia" pitchFamily="34" charset="0"/>
+              <a:buChar char="›"/>
+              <a:defRPr sz="1800" kern="1200">
+                <a:solidFill>
+                  <a:schemeClr val="lt1"/>
+                </a:solidFill>
+                <a:latin typeface="+mn-lt"/>
+                <a:ea typeface="+mn-ea"/>
+                <a:cs typeface="+mn-cs"/>
+              </a:defRPr>
+            </a:lvl7pPr>
+            <a:lvl8pPr marL="2807208" indent="-246888" algn="l" defTabSz="914400" rtl="0" eaLnBrk="1" latinLnBrk="0" hangingPunct="1">
+              <a:lnSpc>
+                <a:spcPct val="90000"/>
+              </a:lnSpc>
+              <a:spcBef>
+                <a:spcPts val="600"/>
+              </a:spcBef>
+              <a:buFont typeface="Euphemia" pitchFamily="34" charset="0"/>
+              <a:buChar char="–"/>
+              <a:defRPr sz="1800" kern="1200" baseline="0">
+                <a:solidFill>
+                  <a:schemeClr val="lt1"/>
+                </a:solidFill>
+                <a:latin typeface="+mn-lt"/>
+                <a:ea typeface="+mn-ea"/>
+                <a:cs typeface="+mn-cs"/>
+              </a:defRPr>
+            </a:lvl8pPr>
+            <a:lvl9pPr marL="3172968" indent="-246888" algn="l" defTabSz="914400" rtl="0" eaLnBrk="1" latinLnBrk="0" hangingPunct="1">
+              <a:lnSpc>
+                <a:spcPct val="90000"/>
+              </a:lnSpc>
+              <a:spcBef>
+                <a:spcPts val="600"/>
+              </a:spcBef>
+              <a:buFont typeface="Euphemia" pitchFamily="34" charset="0"/>
+              <a:buChar char="›"/>
+              <a:defRPr sz="1800" kern="1200" baseline="0">
+                <a:solidFill>
+                  <a:schemeClr val="lt1"/>
+                </a:solidFill>
+                <a:latin typeface="+mn-lt"/>
+                <a:ea typeface="+mn-ea"/>
+                <a:cs typeface="+mn-cs"/>
+              </a:defRPr>
+            </a:lvl9pPr>
+          </a:lstStyle>
+          <a:p>
+            <a:pPr marL="0" indent="0" algn="ctr">
+              <a:buNone/>
+            </a:pPr>
+            <a:r>
+              <a:rPr lang="en-US" sz="7200" b="1" dirty="0">
+                <a:solidFill>
+                  <a:schemeClr val="tx2">
+                    <a:lumMod val="75000"/>
+                    <a:lumOff val="25000"/>
+                  </a:schemeClr>
+                </a:solidFill>
+              </a:rPr>
+              <a:t>009</a:t>
+            </a:r>
+          </a:p>
+        </p:txBody>
+      </p:sp>
+      <p:sp>
+        <p:nvSpPr>
+          <p:cNvPr id="9" name="Title 12">
+            <a:extLst>
+              <a:ext uri="{FF2B5EF4-FFF2-40B4-BE49-F238E27FC236}">
+                <a16:creationId xmlns:a16="http://schemas.microsoft.com/office/drawing/2014/main" id="{7BBBDF52-880F-BC7C-D5D1-B3DE51B74CA6}"/>
+              </a:ext>
+            </a:extLst>
+          </p:cNvPr>
+          <p:cNvSpPr txBox="1">
+            <a:spLocks/>
+          </p:cNvSpPr>
+          <p:nvPr/>
+        </p:nvSpPr>
+        <p:spPr>
+          <a:xfrm>
+            <a:off x="1773932" y="1124744"/>
+            <a:ext cx="9782801" cy="843659"/>
+          </a:xfrm>
+          <a:prstGeom prst="rect">
+            <a:avLst/>
+          </a:prstGeom>
+        </p:spPr>
+        <p:txBody>
+          <a:bodyPr vert="horz" lIns="91440" tIns="45720" rIns="91440" bIns="45720" rtlCol="0" anchor="ctr">
+            <a:normAutofit fontScale="97500"/>
+          </a:bodyPr>
+          <a:lstStyle>
+            <a:lvl1pPr algn="l" defTabSz="914400" rtl="0" eaLnBrk="1" latinLnBrk="0" hangingPunct="1">
+              <a:lnSpc>
+                <a:spcPct val="90000"/>
+              </a:lnSpc>
+              <a:spcBef>
+                <a:spcPct val="0"/>
+              </a:spcBef>
+              <a:buNone/>
+              <a:defRPr sz="3600" kern="1200">
+                <a:solidFill>
+                  <a:schemeClr val="tx1">
+                    <a:lumMod val="75000"/>
+                  </a:schemeClr>
+                </a:solidFill>
+                <a:latin typeface="+mj-lt"/>
+                <a:ea typeface="+mj-ea"/>
+                <a:cs typeface="+mj-cs"/>
+              </a:defRPr>
+            </a:lvl1pPr>
+          </a:lstStyle>
+          <a:p>
+            <a:r>
+              <a:rPr lang="en-US" sz="4800" b="1" dirty="0"/>
+              <a:t>Example: Square To Circle</a:t>
+            </a:r>
+          </a:p>
+        </p:txBody>
+      </p:sp>
+      <p:pic>
+        <p:nvPicPr>
+          <p:cNvPr id="3" name="Picture 2">
+            <a:extLst>
+              <a:ext uri="{FF2B5EF4-FFF2-40B4-BE49-F238E27FC236}">
+                <a16:creationId xmlns:a16="http://schemas.microsoft.com/office/drawing/2014/main" id="{4CF3C876-AEED-89C1-92F5-9DA6BB084C78}"/>
+              </a:ext>
+            </a:extLst>
+          </p:cNvPr>
+          <p:cNvPicPr>
+            <a:picLocks noChangeAspect="1"/>
+          </p:cNvPicPr>
+          <p:nvPr/>
+        </p:nvPicPr>
+        <p:blipFill>
+          <a:blip r:embed="rId4"/>
+          <a:stretch>
+            <a:fillRect/>
+          </a:stretch>
+        </p:blipFill>
+        <p:spPr>
+          <a:xfrm>
+            <a:off x="2076715" y="1954621"/>
+            <a:ext cx="8194161" cy="4770498"/>
+          </a:xfrm>
+          <a:prstGeom prst="rect">
+            <a:avLst/>
+          </a:prstGeom>
+          <a:ln>
+            <a:noFill/>
+          </a:ln>
+          <a:effectLst>
+            <a:outerShdw blurRad="292100" dist="139700" dir="2700000" algn="tl" rotWithShape="0">
+              <a:srgbClr val="333333">
+                <a:alpha val="65000"/>
+              </a:srgbClr>
+            </a:outerShdw>
+          </a:effectLst>
+        </p:spPr>
+      </p:pic>
+    </p:spTree>
+    <p:extLst>
+      <p:ext uri="{BB962C8B-B14F-4D97-AF65-F5344CB8AC3E}">
+        <p14:creationId xmlns:p14="http://schemas.microsoft.com/office/powerpoint/2010/main" val="2224776362"/>
       </p:ext>
     </p:extLst>
   </p:cSld>

</xml_diff>